<commit_message>
refs #4 se actualiza ppt
</commit_message>
<xml_diff>
--- a/Documentación/Factory Pattern.pptx
+++ b/Documentación/Factory Pattern.pptx
@@ -1660,7 +1660,7 @@
         <p:spPr>
           <a:xfrm>
             <a:off x="216000" y="216000"/>
-            <a:ext cx="8855640" cy="363960"/>
+            <a:ext cx="8854920" cy="363960"/>
           </a:xfrm>
           <a:prstGeom prst="rect">
             <a:avLst/>
@@ -1688,7 +1688,11 @@
             </a:pPr>
             <a:r>
               <a:rPr b="0" lang="es-AR" sz="1800" spc="-1" strike="noStrike">
-                <a:latin typeface="Arial"/>
+                <a:solidFill>
+                  <a:srgbClr val="000000"/>
+                </a:solidFill>
+                <a:latin typeface="Arial"/>
+                <a:ea typeface="DejaVu Sans"/>
               </a:rPr>
               <a:t>INGENIERÍA DE SOFTWARE II – Ing. En Sistemas de Información</a:t>
             </a:r>
@@ -1711,7 +1715,7 @@
         <p:spPr>
           <a:xfrm>
             <a:off x="9000000" y="144000"/>
-            <a:ext cx="722520" cy="722520"/>
+            <a:ext cx="721800" cy="721800"/>
           </a:xfrm>
           <a:prstGeom prst="rect">
             <a:avLst/>
@@ -1730,7 +1734,7 @@
         <p:spPr>
           <a:xfrm>
             <a:off x="360000" y="1080000"/>
-            <a:ext cx="9215640" cy="2345760"/>
+            <a:ext cx="9214920" cy="2466720"/>
           </a:xfrm>
           <a:prstGeom prst="rect">
             <a:avLst/>
@@ -1758,7 +1762,11 @@
             </a:pPr>
             <a:r>
               <a:rPr b="1" lang="es-AR" sz="2200" spc="-1" strike="noStrike">
-                <a:latin typeface="Arial"/>
+                <a:solidFill>
+                  <a:srgbClr val="000000"/>
+                </a:solidFill>
+                <a:latin typeface="Arial"/>
+                <a:ea typeface="DejaVu Sans"/>
               </a:rPr>
               <a:t>PATRONES DE DISEÑO</a:t>
             </a:r>
@@ -1797,38 +1805,42 @@
             </a:endParaRPr>
           </a:p>
           <a:p>
-            <a:pPr>
-              <a:lnSpc>
-                <a:spcPct val="100000"/>
-              </a:lnSpc>
-            </a:pPr>
-            <a:r>
-              <a:rPr b="1" lang="es-AR" sz="2000" spc="-1" strike="noStrike">
-                <a:latin typeface="Arial"/>
+            <a:pPr algn="ctr">
+              <a:lnSpc>
+                <a:spcPct val="100000"/>
+              </a:lnSpc>
+            </a:pPr>
+            <a:r>
+              <a:rPr b="1" lang="es-AR" sz="2800" spc="-1" strike="noStrike">
+                <a:solidFill>
+                  <a:srgbClr val="000000"/>
+                </a:solidFill>
+                <a:latin typeface="Arial"/>
+                <a:ea typeface="DejaVu Sans"/>
               </a:rPr>
               <a:t>PATRÓN FACTORY</a:t>
             </a:r>
-            <a:endParaRPr b="0" lang="es-AR" sz="2000" spc="-1" strike="noStrike">
-              <a:latin typeface="Arial"/>
-            </a:endParaRPr>
-          </a:p>
-          <a:p>
-            <a:pPr>
-              <a:lnSpc>
-                <a:spcPct val="100000"/>
-              </a:lnSpc>
-            </a:pPr>
-            <a:endParaRPr b="0" lang="es-AR" sz="2000" spc="-1" strike="noStrike">
-              <a:latin typeface="Arial"/>
-            </a:endParaRPr>
-          </a:p>
-          <a:p>
-            <a:pPr>
-              <a:lnSpc>
-                <a:spcPct val="100000"/>
-              </a:lnSpc>
-            </a:pPr>
-            <a:endParaRPr b="0" lang="es-AR" sz="2000" spc="-1" strike="noStrike">
+            <a:endParaRPr b="0" lang="es-AR" sz="2800" spc="-1" strike="noStrike">
+              <a:latin typeface="Arial"/>
+            </a:endParaRPr>
+          </a:p>
+          <a:p>
+            <a:pPr>
+              <a:lnSpc>
+                <a:spcPct val="100000"/>
+              </a:lnSpc>
+            </a:pPr>
+            <a:endParaRPr b="0" lang="es-AR" sz="2800" spc="-1" strike="noStrike">
+              <a:latin typeface="Arial"/>
+            </a:endParaRPr>
+          </a:p>
+          <a:p>
+            <a:pPr>
+              <a:lnSpc>
+                <a:spcPct val="100000"/>
+              </a:lnSpc>
+            </a:pPr>
+            <a:endParaRPr b="0" lang="es-AR" sz="2800" spc="-1" strike="noStrike">
               <a:latin typeface="Arial"/>
             </a:endParaRPr>
           </a:p>
@@ -1893,14 +1905,14 @@
       </p:grpSpPr>
       <p:sp>
         <p:nvSpPr>
-          <p:cNvPr id="81" name="CustomShape 1"/>
+          <p:cNvPr id="82" name="CustomShape 1"/>
           <p:cNvSpPr/>
           <p:nvPr/>
         </p:nvSpPr>
         <p:spPr>
           <a:xfrm>
             <a:off x="216000" y="216000"/>
-            <a:ext cx="8855640" cy="363960"/>
+            <a:ext cx="8854920" cy="363960"/>
           </a:xfrm>
           <a:prstGeom prst="rect">
             <a:avLst/>
@@ -1928,7 +1940,11 @@
             </a:pPr>
             <a:r>
               <a:rPr b="0" lang="es-AR" sz="1800" spc="-1" strike="noStrike">
-                <a:latin typeface="Arial"/>
+                <a:solidFill>
+                  <a:srgbClr val="000000"/>
+                </a:solidFill>
+                <a:latin typeface="Arial"/>
+                <a:ea typeface="DejaVu Sans"/>
               </a:rPr>
               <a:t>INGENIERÍA DE SOFTWARE II – Ing. En Sistemas de Información</a:t>
             </a:r>
@@ -1940,7 +1956,7 @@
       </p:sp>
       <p:pic>
         <p:nvPicPr>
-          <p:cNvPr id="82" name="" descr=""/>
+          <p:cNvPr id="83" name="" descr=""/>
           <p:cNvPicPr/>
           <p:nvPr/>
         </p:nvPicPr>
@@ -1951,7 +1967,7 @@
         <p:spPr>
           <a:xfrm>
             <a:off x="9000000" y="144000"/>
-            <a:ext cx="722520" cy="722520"/>
+            <a:ext cx="721800" cy="721800"/>
           </a:xfrm>
           <a:prstGeom prst="rect">
             <a:avLst/>
@@ -1963,14 +1979,14 @@
       </p:pic>
       <p:sp>
         <p:nvSpPr>
-          <p:cNvPr id="83" name="CustomShape 2"/>
+          <p:cNvPr id="84" name="CustomShape 2"/>
           <p:cNvSpPr/>
           <p:nvPr/>
         </p:nvSpPr>
         <p:spPr>
           <a:xfrm>
             <a:off x="360000" y="1080000"/>
-            <a:ext cx="4319640" cy="363960"/>
+            <a:ext cx="5760000" cy="364680"/>
           </a:xfrm>
           <a:prstGeom prst="rect">
             <a:avLst/>
@@ -1997,12 +2013,16 @@
               </a:lnSpc>
             </a:pPr>
             <a:r>
-              <a:rPr b="0" lang="es-AR" sz="1800" spc="-1" strike="noStrike">
-                <a:latin typeface="Arial"/>
-              </a:rPr>
-              <a:t>EJEMPLO EN JAVA</a:t>
-            </a:r>
-            <a:endParaRPr b="0" lang="es-AR" sz="1800" spc="-1" strike="noStrike">
+              <a:rPr b="1" lang="es-AR" sz="1800" spc="-1" strike="noStrike">
+                <a:solidFill>
+                  <a:srgbClr val="000000"/>
+                </a:solidFill>
+                <a:latin typeface="Arial"/>
+                <a:ea typeface="DejaVu Sans"/>
+              </a:rPr>
+              <a:t>EJEMPLO CÁLCULO IVA – JAVA Y TYPESCRIPT</a:t>
+            </a:r>
+            <a:endParaRPr b="1" lang="es-AR" sz="1800" spc="-1" strike="noStrike">
               <a:latin typeface="Arial"/>
             </a:endParaRPr>
           </a:p>
@@ -2010,7 +2030,7 @@
       </p:sp>
       <p:pic>
         <p:nvPicPr>
-          <p:cNvPr id="84" name="" descr=""/>
+          <p:cNvPr id="85" name="" descr=""/>
           <p:cNvPicPr/>
           <p:nvPr/>
         </p:nvPicPr>
@@ -2021,7 +2041,7 @@
         <p:spPr>
           <a:xfrm>
             <a:off x="413640" y="1752840"/>
-            <a:ext cx="2466360" cy="1847160"/>
+            <a:ext cx="1674360" cy="1253880"/>
           </a:xfrm>
           <a:prstGeom prst="rect">
             <a:avLst/>
@@ -2033,14 +2053,14 @@
       </p:pic>
       <p:sp>
         <p:nvSpPr>
-          <p:cNvPr id="85" name="TextShape 3"/>
-          <p:cNvSpPr txBox="1"/>
+          <p:cNvPr id="86" name="CustomShape 3"/>
+          <p:cNvSpPr/>
           <p:nvPr/>
         </p:nvSpPr>
         <p:spPr>
           <a:xfrm>
             <a:off x="2880000" y="1551240"/>
-            <a:ext cx="6696000" cy="1688760"/>
+            <a:ext cx="6695280" cy="1794600"/>
           </a:xfrm>
           <a:prstGeom prst="rect">
             <a:avLst/>
@@ -2050,14 +2070,29 @@
             <a:noFill/>
           </a:ln>
         </p:spPr>
+        <p:style>
+          <a:lnRef idx="0"/>
+          <a:fillRef idx="0"/>
+          <a:effectRef idx="0"/>
+          <a:fontRef idx="minor"/>
+        </p:style>
         <p:txBody>
           <a:bodyPr lIns="90000" rIns="90000" tIns="45000" bIns="45000">
             <a:spAutoFit/>
           </a:bodyPr>
           <a:p>
+            <a:pPr>
+              <a:lnSpc>
+                <a:spcPct val="100000"/>
+              </a:lnSpc>
+            </a:pPr>
             <a:r>
               <a:rPr b="0" lang="es-AR" sz="1400" spc="-1" strike="noStrike">
-                <a:latin typeface="Arial"/>
+                <a:solidFill>
+                  <a:srgbClr val="000000"/>
+                </a:solidFill>
+                <a:latin typeface="Arial"/>
+                <a:ea typeface="DejaVu Sans"/>
               </a:rPr>
               <a:t>Una empresa vende artículos informáticos y de oficina.</a:t>
             </a:r>
@@ -2066,9 +2101,18 @@
             </a:endParaRPr>
           </a:p>
           <a:p>
+            <a:pPr>
+              <a:lnSpc>
+                <a:spcPct val="100000"/>
+              </a:lnSpc>
+            </a:pPr>
             <a:r>
               <a:rPr b="0" lang="es-AR" sz="1400" spc="-1" strike="noStrike">
-                <a:latin typeface="Arial"/>
+                <a:solidFill>
+                  <a:srgbClr val="000000"/>
+                </a:solidFill>
+                <a:latin typeface="Arial"/>
+                <a:ea typeface="DejaVu Sans"/>
               </a:rPr>
               <a:t>Ambos artículos graban IVA (Impuesto al Valor Agregado), pero los informáticos tienen una tasa del 10.7%, los de oficina el 21% y dentro de los informáticos hay algunos casos particulares donde AFIP extenúa el pago del impuesto (artículos exentos).</a:t>
             </a:r>
@@ -2077,20 +2121,38 @@
             </a:endParaRPr>
           </a:p>
           <a:p>
+            <a:pPr>
+              <a:lnSpc>
+                <a:spcPct val="100000"/>
+              </a:lnSpc>
+            </a:pPr>
             <a:endParaRPr b="0" lang="es-AR" sz="1400" spc="-1" strike="noStrike">
               <a:latin typeface="Arial"/>
             </a:endParaRPr>
           </a:p>
           <a:p>
+            <a:pPr>
+              <a:lnSpc>
+                <a:spcPct val="100000"/>
+              </a:lnSpc>
+            </a:pPr>
             <a:r>
               <a:rPr b="1" lang="es-AR" sz="1400" spc="-1" strike="noStrike">
-                <a:latin typeface="Arial"/>
+                <a:solidFill>
+                  <a:srgbClr val="000000"/>
+                </a:solidFill>
+                <a:latin typeface="Arial"/>
+                <a:ea typeface="DejaVu Sans"/>
               </a:rPr>
               <a:t>Se desea poder obtener el valor del IVA para todos los artículos disponibles y posibilitar el agregado futuro de nuevas condiciones para su cálculo</a:t>
             </a:r>
             <a:r>
               <a:rPr b="1" lang="es-AR" sz="1200" spc="-1" strike="noStrike">
-                <a:latin typeface="Arial"/>
+                <a:solidFill>
+                  <a:srgbClr val="000000"/>
+                </a:solidFill>
+                <a:latin typeface="Arial"/>
+                <a:ea typeface="DejaVu Sans"/>
               </a:rPr>
               <a:t>.</a:t>
             </a:r>
@@ -2102,13 +2164,13 @@
       </p:sp>
       <p:graphicFrame>
         <p:nvGraphicFramePr>
-          <p:cNvPr id="86" name="Table 4"/>
+          <p:cNvPr id="87" name="Table 4"/>
           <p:cNvGraphicFramePr/>
           <p:nvPr/>
         </p:nvGraphicFramePr>
         <p:xfrm>
           <a:off x="2972880" y="3373200"/>
-          <a:ext cx="6171120" cy="1810800"/>
+          <a:ext cx="6170760" cy="1810080"/>
         </p:xfrm>
         <a:graphic>
           <a:graphicData uri="http://schemas.openxmlformats.org/drawingml/2006/table">
@@ -2122,19 +2184,23 @@
               <a:tr h="330480">
                 <a:tc>
                   <a:txBody>
-                    <a:bodyPr lIns="90000" rIns="90000" tIns="46800" bIns="46800">
+                    <a:bodyPr lIns="90000" rIns="90000">
                       <a:noAutofit/>
                     </a:bodyPr>
                     <a:p>
-                      <a:pPr algn="ctr"/>
+                      <a:pPr algn="ctr">
+                        <a:lnSpc>
+                          <a:spcPct val="100000"/>
+                        </a:lnSpc>
+                      </a:pPr>
                       <a:r>
                         <a:rPr b="1" lang="es-AR" sz="1400" spc="-1" strike="noStrike">
                           <a:latin typeface="Calibri"/>
                         </a:rPr>
                         <a:t>ARTÍCULO</a:t>
                       </a:r>
-                      <a:endParaRPr b="1" lang="es-AR" sz="1400" spc="-1" strike="noStrike">
-                        <a:latin typeface="Calibri"/>
+                      <a:endParaRPr b="0" lang="es-AR" sz="1400" spc="-1" strike="noStrike">
+                        <a:latin typeface="Arial"/>
                       </a:endParaRPr>
                     </a:p>
                   </a:txBody>
@@ -2164,19 +2230,23 @@
                 </a:tc>
                 <a:tc>
                   <a:txBody>
-                    <a:bodyPr lIns="90000" rIns="90000" tIns="46800" bIns="46800">
+                    <a:bodyPr lIns="90000" rIns="90000">
                       <a:noAutofit/>
                     </a:bodyPr>
                     <a:p>
-                      <a:pPr algn="ctr"/>
+                      <a:pPr algn="ctr">
+                        <a:lnSpc>
+                          <a:spcPct val="100000"/>
+                        </a:lnSpc>
+                      </a:pPr>
                       <a:r>
                         <a:rPr b="1" lang="es-AR" sz="1400" spc="-1" strike="noStrike">
                           <a:latin typeface="Calibri"/>
                         </a:rPr>
                         <a:t>IVA</a:t>
                       </a:r>
-                      <a:endParaRPr b="1" lang="es-AR" sz="1400" spc="-1" strike="noStrike">
-                        <a:latin typeface="Calibri"/>
+                      <a:endParaRPr b="0" lang="es-AR" sz="1400" spc="-1" strike="noStrike">
+                        <a:latin typeface="Arial"/>
                       </a:endParaRPr>
                     </a:p>
                   </a:txBody>
@@ -2206,19 +2276,23 @@
                 </a:tc>
                 <a:tc>
                   <a:txBody>
-                    <a:bodyPr lIns="90000" rIns="90000" tIns="46800" bIns="46800">
+                    <a:bodyPr lIns="90000" rIns="90000">
                       <a:noAutofit/>
                     </a:bodyPr>
                     <a:p>
-                      <a:pPr algn="ctr"/>
+                      <a:pPr algn="ctr">
+                        <a:lnSpc>
+                          <a:spcPct val="100000"/>
+                        </a:lnSpc>
+                      </a:pPr>
                       <a:r>
                         <a:rPr b="1" lang="es-AR" sz="1400" spc="-1" strike="noStrike">
                           <a:latin typeface="Calibri"/>
                         </a:rPr>
                         <a:t>Descripción</a:t>
                       </a:r>
-                      <a:endParaRPr b="1" lang="es-AR" sz="1400" spc="-1" strike="noStrike">
-                        <a:latin typeface="Calibri"/>
+                      <a:endParaRPr b="0" lang="es-AR" sz="1400" spc="-1" strike="noStrike">
+                        <a:latin typeface="Arial"/>
                       </a:endParaRPr>
                     </a:p>
                   </a:txBody>
@@ -2250,11 +2324,15 @@
               <a:tr h="585000">
                 <a:tc rowSpan="2">
                   <a:txBody>
-                    <a:bodyPr lIns="90000" rIns="90000" tIns="46800" bIns="46800" anchor="ctr">
+                    <a:bodyPr lIns="90000" rIns="90000">
                       <a:noAutofit/>
                     </a:bodyPr>
                     <a:p>
-                      <a:pPr algn="ctr"/>
+                      <a:pPr algn="ctr">
+                        <a:lnSpc>
+                          <a:spcPct val="100000"/>
+                        </a:lnSpc>
+                      </a:pPr>
                       <a:r>
                         <a:rPr b="0" lang="es-AR" sz="1200" spc="-1" strike="noStrike">
                           <a:latin typeface="Calibri"/>
@@ -2262,7 +2340,7 @@
                         <a:t>Informáticos</a:t>
                       </a:r>
                       <a:endParaRPr b="0" lang="es-AR" sz="1200" spc="-1" strike="noStrike">
-                        <a:latin typeface="Calibri"/>
+                        <a:latin typeface="Arial"/>
                       </a:endParaRPr>
                     </a:p>
                   </a:txBody>
@@ -2292,11 +2370,15 @@
                 </a:tc>
                 <a:tc>
                   <a:txBody>
-                    <a:bodyPr lIns="90000" rIns="90000" tIns="46800" bIns="46800" anchor="ctr">
+                    <a:bodyPr lIns="90000" rIns="90000">
                       <a:noAutofit/>
                     </a:bodyPr>
                     <a:p>
-                      <a:pPr algn="ctr"/>
+                      <a:pPr algn="ctr">
+                        <a:lnSpc>
+                          <a:spcPct val="100000"/>
+                        </a:lnSpc>
+                      </a:pPr>
                       <a:r>
                         <a:rPr b="0" lang="es-AR" sz="1200" spc="-1" strike="noStrike">
                           <a:latin typeface="Calibri"/>
@@ -2304,7 +2386,7 @@
                         <a:t>10.7%</a:t>
                       </a:r>
                       <a:endParaRPr b="0" lang="es-AR" sz="1200" spc="-1" strike="noStrike">
-                        <a:latin typeface="Calibri"/>
+                        <a:latin typeface="Arial"/>
                       </a:endParaRPr>
                     </a:p>
                   </a:txBody>
@@ -2334,11 +2416,15 @@
                 </a:tc>
                 <a:tc>
                   <a:txBody>
-                    <a:bodyPr lIns="90000" rIns="90000" tIns="46800" bIns="46800" anchor="ctr">
+                    <a:bodyPr lIns="90000" rIns="90000">
                       <a:noAutofit/>
                     </a:bodyPr>
                     <a:p>
-                      <a:pPr algn="ctr"/>
+                      <a:pPr algn="ctr">
+                        <a:lnSpc>
+                          <a:spcPct val="100000"/>
+                        </a:lnSpc>
+                      </a:pPr>
                       <a:r>
                         <a:rPr b="0" lang="es-AR" sz="1200" spc="-1" strike="noStrike">
                           <a:latin typeface="Calibri"/>
@@ -2346,7 +2432,7 @@
                         <a:t>La gran mayoría</a:t>
                       </a:r>
                       <a:endParaRPr b="0" lang="es-AR" sz="1200" spc="-1" strike="noStrike">
-                        <a:latin typeface="Calibri"/>
+                        <a:latin typeface="Arial"/>
                       </a:endParaRPr>
                     </a:p>
                   </a:txBody>
@@ -2378,36 +2464,22 @@
               <a:tr h="595440">
                 <a:tc vMerge="1">
                   <a:tcPr marL="90000" marR="90000">
-                    <a:lnL w="720">
-                      <a:solidFill>
-                        <a:srgbClr val="000000"/>
-                      </a:solidFill>
-                    </a:lnL>
-                    <a:lnR w="720">
-                      <a:solidFill>
-                        <a:srgbClr val="000000"/>
-                      </a:solidFill>
-                    </a:lnR>
-                    <a:lnT w="720">
-                      <a:solidFill>
-                        <a:srgbClr val="000000"/>
-                      </a:solidFill>
-                    </a:lnT>
-                    <a:lnB w="720">
-                      <a:solidFill>
-                        <a:srgbClr val="000000"/>
-                      </a:solidFill>
-                    </a:lnB>
-                    <a:noFill/>
+                    <a:solidFill>
+                      <a:srgbClr val="729fcf"/>
+                    </a:solidFill>
                   </a:tcPr>
                 </a:tc>
                 <a:tc>
                   <a:txBody>
-                    <a:bodyPr lIns="90000" rIns="90000" tIns="46800" bIns="46800" anchor="ctr">
+                    <a:bodyPr lIns="90000" rIns="90000">
                       <a:noAutofit/>
                     </a:bodyPr>
                     <a:p>
-                      <a:pPr algn="ctr"/>
+                      <a:pPr algn="ctr">
+                        <a:lnSpc>
+                          <a:spcPct val="100000"/>
+                        </a:lnSpc>
+                      </a:pPr>
                       <a:r>
                         <a:rPr b="0" lang="es-AR" sz="1200" spc="-1" strike="noStrike">
                           <a:latin typeface="Calibri"/>
@@ -2415,7 +2487,7 @@
                         <a:t>0</a:t>
                       </a:r>
                       <a:endParaRPr b="0" lang="es-AR" sz="1200" spc="-1" strike="noStrike">
-                        <a:latin typeface="Calibri"/>
+                        <a:latin typeface="Arial"/>
                       </a:endParaRPr>
                     </a:p>
                   </a:txBody>
@@ -2445,11 +2517,15 @@
                 </a:tc>
                 <a:tc>
                   <a:txBody>
-                    <a:bodyPr lIns="90000" rIns="90000" tIns="46800" bIns="46800" anchor="ctr">
+                    <a:bodyPr lIns="90000" rIns="90000">
                       <a:noAutofit/>
                     </a:bodyPr>
                     <a:p>
-                      <a:pPr algn="ctr"/>
+                      <a:pPr algn="ctr">
+                        <a:lnSpc>
+                          <a:spcPct val="100000"/>
+                        </a:lnSpc>
+                      </a:pPr>
                       <a:r>
                         <a:rPr b="0" lang="es-AR" sz="1200" spc="-1" strike="noStrike">
                           <a:latin typeface="Calibri"/>
@@ -2457,7 +2533,7 @@
                         <a:t>Artículos particulares</a:t>
                       </a:r>
                       <a:endParaRPr b="0" lang="es-AR" sz="1200" spc="-1" strike="noStrike">
-                        <a:latin typeface="Calibri"/>
+                        <a:latin typeface="Arial"/>
                       </a:endParaRPr>
                     </a:p>
                   </a:txBody>
@@ -2486,14 +2562,18 @@
                   </a:tcPr>
                 </a:tc>
               </a:tr>
-              <a:tr h="299880">
+              <a:tr h="299160">
                 <a:tc>
                   <a:txBody>
-                    <a:bodyPr lIns="90000" rIns="90000" tIns="46800" bIns="46800" anchor="ctr">
+                    <a:bodyPr lIns="90000" rIns="90000">
                       <a:noAutofit/>
                     </a:bodyPr>
                     <a:p>
-                      <a:pPr algn="ctr"/>
+                      <a:pPr algn="ctr">
+                        <a:lnSpc>
+                          <a:spcPct val="100000"/>
+                        </a:lnSpc>
+                      </a:pPr>
                       <a:r>
                         <a:rPr b="0" lang="es-AR" sz="1200" spc="-1" strike="noStrike">
                           <a:latin typeface="Calibri"/>
@@ -2501,7 +2581,7 @@
                         <a:t>Oficina</a:t>
                       </a:r>
                       <a:endParaRPr b="0" lang="es-AR" sz="1200" spc="-1" strike="noStrike">
-                        <a:latin typeface="Calibri"/>
+                        <a:latin typeface="Arial"/>
                       </a:endParaRPr>
                     </a:p>
                   </a:txBody>
@@ -2531,11 +2611,15 @@
                 </a:tc>
                 <a:tc>
                   <a:txBody>
-                    <a:bodyPr lIns="90000" rIns="90000" tIns="46800" bIns="46800" anchor="ctr">
+                    <a:bodyPr lIns="90000" rIns="90000">
                       <a:noAutofit/>
                     </a:bodyPr>
                     <a:p>
-                      <a:pPr algn="ctr"/>
+                      <a:pPr algn="ctr">
+                        <a:lnSpc>
+                          <a:spcPct val="100000"/>
+                        </a:lnSpc>
+                      </a:pPr>
                       <a:r>
                         <a:rPr b="0" lang="es-AR" sz="1200" spc="-1" strike="noStrike">
                           <a:latin typeface="Calibri"/>
@@ -2543,7 +2627,7 @@
                         <a:t>21%</a:t>
                       </a:r>
                       <a:endParaRPr b="0" lang="es-AR" sz="1200" spc="-1" strike="noStrike">
-                        <a:latin typeface="Calibri"/>
+                        <a:latin typeface="Arial"/>
                       </a:endParaRPr>
                     </a:p>
                   </a:txBody>
@@ -2573,11 +2657,15 @@
                 </a:tc>
                 <a:tc>
                   <a:txBody>
-                    <a:bodyPr lIns="90000" rIns="90000" tIns="46800" bIns="46800" anchor="ctr">
+                    <a:bodyPr lIns="90000" rIns="90000">
                       <a:noAutofit/>
                     </a:bodyPr>
                     <a:p>
-                      <a:pPr algn="ctr"/>
+                      <a:pPr algn="ctr">
+                        <a:lnSpc>
+                          <a:spcPct val="100000"/>
+                        </a:lnSpc>
+                      </a:pPr>
                       <a:r>
                         <a:rPr b="0" lang="es-AR" sz="1200" spc="-1" strike="noStrike">
                           <a:latin typeface="Calibri"/>
@@ -2585,7 +2673,7 @@
                         <a:t>Todos los artículos de oficina</a:t>
                       </a:r>
                       <a:endParaRPr b="0" lang="es-AR" sz="1200" spc="-1" strike="noStrike">
-                        <a:latin typeface="Calibri"/>
+                        <a:latin typeface="Arial"/>
                       </a:endParaRPr>
                     </a:p>
                   </a:txBody>
@@ -2618,6 +2706,29 @@
           </a:graphicData>
         </a:graphic>
       </p:graphicFrame>
+      <p:pic>
+        <p:nvPicPr>
+          <p:cNvPr id="88" name="" descr=""/>
+          <p:cNvPicPr/>
+          <p:nvPr/>
+        </p:nvPicPr>
+        <p:blipFill>
+          <a:blip r:embed="rId3"/>
+          <a:stretch/>
+        </p:blipFill>
+        <p:spPr>
+          <a:xfrm>
+            <a:off x="576000" y="3482640"/>
+            <a:ext cx="1583280" cy="1053360"/>
+          </a:xfrm>
+          <a:prstGeom prst="rect">
+            <a:avLst/>
+          </a:prstGeom>
+          <a:ln>
+            <a:noFill/>
+          </a:ln>
+        </p:spPr>
+      </p:pic>
     </p:spTree>
   </p:cSld>
   <mc:AlternateContent>
@@ -2677,14 +2788,14 @@
       </p:grpSpPr>
       <p:sp>
         <p:nvSpPr>
-          <p:cNvPr id="87" name="CustomShape 1"/>
+          <p:cNvPr id="89" name="CustomShape 1"/>
           <p:cNvSpPr/>
           <p:nvPr/>
         </p:nvSpPr>
         <p:spPr>
           <a:xfrm>
             <a:off x="216000" y="216000"/>
-            <a:ext cx="8855640" cy="363960"/>
+            <a:ext cx="8854920" cy="363960"/>
           </a:xfrm>
           <a:prstGeom prst="rect">
             <a:avLst/>
@@ -2712,7 +2823,11 @@
             </a:pPr>
             <a:r>
               <a:rPr b="0" lang="es-AR" sz="1800" spc="-1" strike="noStrike">
-                <a:latin typeface="Arial"/>
+                <a:solidFill>
+                  <a:srgbClr val="000000"/>
+                </a:solidFill>
+                <a:latin typeface="Arial"/>
+                <a:ea typeface="DejaVu Sans"/>
               </a:rPr>
               <a:t>INGENIERÍA DE SOFTWARE II – Ing. En Sistemas de Información</a:t>
             </a:r>
@@ -2724,7 +2839,7 @@
       </p:sp>
       <p:pic>
         <p:nvPicPr>
-          <p:cNvPr id="88" name="" descr=""/>
+          <p:cNvPr id="90" name="" descr=""/>
           <p:cNvPicPr/>
           <p:nvPr/>
         </p:nvPicPr>
@@ -2735,7 +2850,7 @@
         <p:spPr>
           <a:xfrm>
             <a:off x="9000000" y="144000"/>
-            <a:ext cx="722520" cy="722520"/>
+            <a:ext cx="721800" cy="721800"/>
           </a:xfrm>
           <a:prstGeom prst="rect">
             <a:avLst/>
@@ -2747,14 +2862,14 @@
       </p:pic>
       <p:sp>
         <p:nvSpPr>
-          <p:cNvPr id="89" name="CustomShape 2"/>
+          <p:cNvPr id="91" name="CustomShape 2"/>
           <p:cNvSpPr/>
           <p:nvPr/>
         </p:nvSpPr>
         <p:spPr>
           <a:xfrm>
             <a:off x="360000" y="1080000"/>
-            <a:ext cx="4319640" cy="363960"/>
+            <a:ext cx="5760000" cy="364680"/>
           </a:xfrm>
           <a:prstGeom prst="rect">
             <a:avLst/>
@@ -2781,50 +2896,31 @@
               </a:lnSpc>
             </a:pPr>
             <a:r>
-              <a:rPr b="0" lang="es-AR" sz="1800" spc="-1" strike="noStrike">
-                <a:latin typeface="Arial"/>
-              </a:rPr>
-              <a:t>EJEMPLO EN TYPESCRIPT</a:t>
-            </a:r>
-            <a:endParaRPr b="0" lang="es-AR" sz="1800" spc="-1" strike="noStrike">
-              <a:latin typeface="Arial"/>
-            </a:endParaRPr>
-          </a:p>
-        </p:txBody>
-      </p:sp>
-      <p:pic>
-        <p:nvPicPr>
-          <p:cNvPr id="90" name="" descr=""/>
-          <p:cNvPicPr/>
-          <p:nvPr/>
-        </p:nvPicPr>
-        <p:blipFill>
-          <a:blip r:embed="rId2"/>
-          <a:stretch/>
-        </p:blipFill>
-        <p:spPr>
-          <a:xfrm>
-            <a:off x="504000" y="1857600"/>
-            <a:ext cx="1584000" cy="1054080"/>
-          </a:xfrm>
-          <a:prstGeom prst="rect">
-            <a:avLst/>
-          </a:prstGeom>
-          <a:ln>
-            <a:noFill/>
-          </a:ln>
-        </p:spPr>
-      </p:pic>
-      <p:sp>
-        <p:nvSpPr>
-          <p:cNvPr id="91" name="TextShape 3"/>
+              <a:rPr b="1" lang="es-AR" sz="1800" spc="-1" strike="noStrike">
+                <a:solidFill>
+                  <a:srgbClr val="000000"/>
+                </a:solidFill>
+                <a:latin typeface="Arial"/>
+                <a:ea typeface="DejaVu Sans"/>
+              </a:rPr>
+              <a:t>EJEMPLO CÁLCULO IVA – JAVA Y TYPESCRIPT</a:t>
+            </a:r>
+            <a:endParaRPr b="1" lang="es-AR" sz="1800" spc="-1" strike="noStrike">
+              <a:latin typeface="Arial"/>
+            </a:endParaRPr>
+          </a:p>
+        </p:txBody>
+      </p:sp>
+      <p:sp>
+        <p:nvSpPr>
+          <p:cNvPr id="92" name="TextShape 3"/>
           <p:cNvSpPr txBox="1"/>
           <p:nvPr/>
         </p:nvSpPr>
         <p:spPr>
           <a:xfrm>
-            <a:off x="2880000" y="1551600"/>
-            <a:ext cx="6696000" cy="1688760"/>
+            <a:off x="1251000" y="2701800"/>
+            <a:ext cx="7699320" cy="456120"/>
           </a:xfrm>
           <a:prstGeom prst="rect">
             <a:avLst/>
@@ -2840,568 +2936,18 @@
           </a:bodyPr>
           <a:p>
             <a:r>
-              <a:rPr b="0" lang="es-AR" sz="1400" spc="-1" strike="noStrike">
-                <a:latin typeface="Arial"/>
-              </a:rPr>
-              <a:t>Una empresa vende artículos informáticos y de oficina.</a:t>
-            </a:r>
-            <a:endParaRPr b="0" lang="es-AR" sz="1400" spc="-1" strike="noStrike">
-              <a:latin typeface="Arial"/>
-            </a:endParaRPr>
-          </a:p>
-          <a:p>
-            <a:r>
-              <a:rPr b="0" lang="es-AR" sz="1400" spc="-1" strike="noStrike">
-                <a:latin typeface="Arial"/>
-              </a:rPr>
-              <a:t>Ambos artículos graban IVA (Impuesto al Valor Agregado), pero los informáticos tienen una tasa del 10.7%, los de oficina el 21% y dentro de los informáticos hay algunos casos particulares donde AFIP extenúa el pago del impuesto (artículos exentos).</a:t>
-            </a:r>
-            <a:endParaRPr b="0" lang="es-AR" sz="1400" spc="-1" strike="noStrike">
-              <a:latin typeface="Arial"/>
-            </a:endParaRPr>
-          </a:p>
-          <a:p>
-            <a:endParaRPr b="0" lang="es-AR" sz="1400" spc="-1" strike="noStrike">
-              <a:latin typeface="Arial"/>
-            </a:endParaRPr>
-          </a:p>
-          <a:p>
-            <a:r>
-              <a:rPr b="1" lang="es-AR" sz="1400" spc="-1" strike="noStrike">
-                <a:latin typeface="Arial"/>
-              </a:rPr>
-              <a:t>Se desea poder obtener el valor del IVA para todos los artículos disponibles y posibilitar el agregado futuro de nuevas condiciones para su cálculo</a:t>
-            </a:r>
-            <a:r>
-              <a:rPr b="1" lang="es-AR" sz="1200" spc="-1" strike="noStrike">
-                <a:latin typeface="Arial"/>
-              </a:rPr>
-              <a:t>.</a:t>
-            </a:r>
-            <a:endParaRPr b="0" lang="es-AR" sz="1200" spc="-1" strike="noStrike">
-              <a:latin typeface="Arial"/>
-            </a:endParaRPr>
-          </a:p>
-        </p:txBody>
-      </p:sp>
-      <p:graphicFrame>
-        <p:nvGraphicFramePr>
-          <p:cNvPr id="92" name="Table 4"/>
-          <p:cNvGraphicFramePr/>
-          <p:nvPr/>
-        </p:nvGraphicFramePr>
-        <p:xfrm>
-          <a:off x="2973240" y="3373560"/>
-          <a:ext cx="6171120" cy="1810800"/>
-        </p:xfrm>
-        <a:graphic>
-          <a:graphicData uri="http://schemas.openxmlformats.org/drawingml/2006/table">
-            <a:tbl>
-              <a:tblPr/>
-              <a:tblGrid>
-                <a:gridCol w="2056680"/>
-                <a:gridCol w="2056680"/>
-                <a:gridCol w="2057760"/>
-              </a:tblGrid>
-              <a:tr h="330480">
-                <a:tc>
-                  <a:txBody>
-                    <a:bodyPr lIns="90000" rIns="90000" tIns="46800" bIns="46800">
-                      <a:noAutofit/>
-                    </a:bodyPr>
-                    <a:p>
-                      <a:pPr algn="ctr"/>
-                      <a:r>
-                        <a:rPr b="1" lang="es-AR" sz="1400" spc="-1" strike="noStrike">
-                          <a:latin typeface="Calibri"/>
-                        </a:rPr>
-                        <a:t>ARTÍCULO</a:t>
-                      </a:r>
-                      <a:endParaRPr b="1" lang="es-AR" sz="1400" spc="-1" strike="noStrike">
-                        <a:latin typeface="Calibri"/>
-                      </a:endParaRPr>
-                    </a:p>
-                  </a:txBody>
-                  <a:tcPr marL="90000" marR="90000">
-                    <a:lnL w="720">
-                      <a:solidFill>
-                        <a:srgbClr val="000000"/>
-                      </a:solidFill>
-                    </a:lnL>
-                    <a:lnR w="720">
-                      <a:solidFill>
-                        <a:srgbClr val="000000"/>
-                      </a:solidFill>
-                    </a:lnR>
-                    <a:lnT w="720">
-                      <a:solidFill>
-                        <a:srgbClr val="000000"/>
-                      </a:solidFill>
-                    </a:lnT>
-                    <a:lnB w="720">
-                      <a:solidFill>
-                        <a:srgbClr val="000000"/>
-                      </a:solidFill>
-                    </a:lnB>
-                    <a:noFill/>
-                  </a:tcPr>
-                </a:tc>
-                <a:tc>
-                  <a:txBody>
-                    <a:bodyPr lIns="90000" rIns="90000" tIns="46800" bIns="46800">
-                      <a:noAutofit/>
-                    </a:bodyPr>
-                    <a:p>
-                      <a:pPr algn="ctr"/>
-                      <a:r>
-                        <a:rPr b="1" lang="es-AR" sz="1400" spc="-1" strike="noStrike">
-                          <a:latin typeface="Calibri"/>
-                        </a:rPr>
-                        <a:t>IVA</a:t>
-                      </a:r>
-                      <a:endParaRPr b="1" lang="es-AR" sz="1400" spc="-1" strike="noStrike">
-                        <a:latin typeface="Calibri"/>
-                      </a:endParaRPr>
-                    </a:p>
-                  </a:txBody>
-                  <a:tcPr marL="90000" marR="90000">
-                    <a:lnL w="720">
-                      <a:solidFill>
-                        <a:srgbClr val="000000"/>
-                      </a:solidFill>
-                    </a:lnL>
-                    <a:lnR w="720">
-                      <a:solidFill>
-                        <a:srgbClr val="000000"/>
-                      </a:solidFill>
-                    </a:lnR>
-                    <a:lnT w="720">
-                      <a:solidFill>
-                        <a:srgbClr val="000000"/>
-                      </a:solidFill>
-                    </a:lnT>
-                    <a:lnB w="720">
-                      <a:solidFill>
-                        <a:srgbClr val="000000"/>
-                      </a:solidFill>
-                    </a:lnB>
-                    <a:noFill/>
-                  </a:tcPr>
-                </a:tc>
-                <a:tc>
-                  <a:txBody>
-                    <a:bodyPr lIns="90000" rIns="90000" tIns="46800" bIns="46800">
-                      <a:noAutofit/>
-                    </a:bodyPr>
-                    <a:p>
-                      <a:pPr algn="ctr"/>
-                      <a:r>
-                        <a:rPr b="1" lang="es-AR" sz="1400" spc="-1" strike="noStrike">
-                          <a:latin typeface="Calibri"/>
-                        </a:rPr>
-                        <a:t>Descripción</a:t>
-                      </a:r>
-                      <a:endParaRPr b="1" lang="es-AR" sz="1400" spc="-1" strike="noStrike">
-                        <a:latin typeface="Calibri"/>
-                      </a:endParaRPr>
-                    </a:p>
-                  </a:txBody>
-                  <a:tcPr marL="90000" marR="90000">
-                    <a:lnL w="720">
-                      <a:solidFill>
-                        <a:srgbClr val="000000"/>
-                      </a:solidFill>
-                    </a:lnL>
-                    <a:lnR w="720">
-                      <a:solidFill>
-                        <a:srgbClr val="000000"/>
-                      </a:solidFill>
-                    </a:lnR>
-                    <a:lnT w="720">
-                      <a:solidFill>
-                        <a:srgbClr val="000000"/>
-                      </a:solidFill>
-                    </a:lnT>
-                    <a:lnB w="720">
-                      <a:solidFill>
-                        <a:srgbClr val="000000"/>
-                      </a:solidFill>
-                    </a:lnB>
-                    <a:noFill/>
-                  </a:tcPr>
-                </a:tc>
-              </a:tr>
-              <a:tr h="585000">
-                <a:tc rowSpan="2">
-                  <a:txBody>
-                    <a:bodyPr lIns="90000" rIns="90000" tIns="46800" bIns="46800" anchor="ctr">
-                      <a:noAutofit/>
-                    </a:bodyPr>
-                    <a:p>
-                      <a:pPr algn="ctr"/>
-                      <a:r>
-                        <a:rPr b="0" lang="es-AR" sz="1200" spc="-1" strike="noStrike">
-                          <a:latin typeface="Calibri"/>
-                        </a:rPr>
-                        <a:t>Informáticos</a:t>
-                      </a:r>
-                      <a:endParaRPr b="0" lang="es-AR" sz="1200" spc="-1" strike="noStrike">
-                        <a:latin typeface="Calibri"/>
-                      </a:endParaRPr>
-                    </a:p>
-                  </a:txBody>
-                  <a:tcPr marL="90000" marR="90000">
-                    <a:lnL w="720">
-                      <a:solidFill>
-                        <a:srgbClr val="000000"/>
-                      </a:solidFill>
-                    </a:lnL>
-                    <a:lnR w="720">
-                      <a:solidFill>
-                        <a:srgbClr val="000000"/>
-                      </a:solidFill>
-                    </a:lnR>
-                    <a:lnT w="720">
-                      <a:solidFill>
-                        <a:srgbClr val="000000"/>
-                      </a:solidFill>
-                    </a:lnT>
-                    <a:lnB w="720">
-                      <a:solidFill>
-                        <a:srgbClr val="000000"/>
-                      </a:solidFill>
-                    </a:lnB>
-                    <a:noFill/>
-                  </a:tcPr>
-                </a:tc>
-                <a:tc>
-                  <a:txBody>
-                    <a:bodyPr lIns="90000" rIns="90000" tIns="46800" bIns="46800" anchor="ctr">
-                      <a:noAutofit/>
-                    </a:bodyPr>
-                    <a:p>
-                      <a:pPr algn="ctr"/>
-                      <a:r>
-                        <a:rPr b="0" lang="es-AR" sz="1200" spc="-1" strike="noStrike">
-                          <a:latin typeface="Calibri"/>
-                        </a:rPr>
-                        <a:t>10.7%</a:t>
-                      </a:r>
-                      <a:endParaRPr b="0" lang="es-AR" sz="1200" spc="-1" strike="noStrike">
-                        <a:latin typeface="Calibri"/>
-                      </a:endParaRPr>
-                    </a:p>
-                  </a:txBody>
-                  <a:tcPr marL="90000" marR="90000">
-                    <a:lnL w="720">
-                      <a:solidFill>
-                        <a:srgbClr val="000000"/>
-                      </a:solidFill>
-                    </a:lnL>
-                    <a:lnR w="720">
-                      <a:solidFill>
-                        <a:srgbClr val="000000"/>
-                      </a:solidFill>
-                    </a:lnR>
-                    <a:lnT w="720">
-                      <a:solidFill>
-                        <a:srgbClr val="000000"/>
-                      </a:solidFill>
-                    </a:lnT>
-                    <a:lnB w="720">
-                      <a:solidFill>
-                        <a:srgbClr val="000000"/>
-                      </a:solidFill>
-                    </a:lnB>
-                    <a:noFill/>
-                  </a:tcPr>
-                </a:tc>
-                <a:tc>
-                  <a:txBody>
-                    <a:bodyPr lIns="90000" rIns="90000" tIns="46800" bIns="46800" anchor="ctr">
-                      <a:noAutofit/>
-                    </a:bodyPr>
-                    <a:p>
-                      <a:pPr algn="ctr"/>
-                      <a:r>
-                        <a:rPr b="0" lang="es-AR" sz="1200" spc="-1" strike="noStrike">
-                          <a:latin typeface="Calibri"/>
-                        </a:rPr>
-                        <a:t>La gran mayoría</a:t>
-                      </a:r>
-                      <a:endParaRPr b="0" lang="es-AR" sz="1200" spc="-1" strike="noStrike">
-                        <a:latin typeface="Calibri"/>
-                      </a:endParaRPr>
-                    </a:p>
-                  </a:txBody>
-                  <a:tcPr marL="90000" marR="90000">
-                    <a:lnL w="720">
-                      <a:solidFill>
-                        <a:srgbClr val="000000"/>
-                      </a:solidFill>
-                    </a:lnL>
-                    <a:lnR w="720">
-                      <a:solidFill>
-                        <a:srgbClr val="000000"/>
-                      </a:solidFill>
-                    </a:lnR>
-                    <a:lnT w="720">
-                      <a:solidFill>
-                        <a:srgbClr val="000000"/>
-                      </a:solidFill>
-                    </a:lnT>
-                    <a:lnB w="720">
-                      <a:solidFill>
-                        <a:srgbClr val="000000"/>
-                      </a:solidFill>
-                    </a:lnB>
-                    <a:noFill/>
-                  </a:tcPr>
-                </a:tc>
-              </a:tr>
-              <a:tr h="595440">
-                <a:tc vMerge="1">
-                  <a:tcPr marL="90000" marR="90000">
-                    <a:lnL w="720">
-                      <a:solidFill>
-                        <a:srgbClr val="000000"/>
-                      </a:solidFill>
-                    </a:lnL>
-                    <a:lnR w="720">
-                      <a:solidFill>
-                        <a:srgbClr val="000000"/>
-                      </a:solidFill>
-                    </a:lnR>
-                    <a:lnT w="720">
-                      <a:solidFill>
-                        <a:srgbClr val="000000"/>
-                      </a:solidFill>
-                    </a:lnT>
-                    <a:lnB w="720">
-                      <a:solidFill>
-                        <a:srgbClr val="000000"/>
-                      </a:solidFill>
-                    </a:lnB>
-                    <a:noFill/>
-                  </a:tcPr>
-                </a:tc>
-                <a:tc>
-                  <a:txBody>
-                    <a:bodyPr lIns="90000" rIns="90000" tIns="46800" bIns="46800" anchor="ctr">
-                      <a:noAutofit/>
-                    </a:bodyPr>
-                    <a:p>
-                      <a:pPr algn="ctr"/>
-                      <a:r>
-                        <a:rPr b="0" lang="es-AR" sz="1200" spc="-1" strike="noStrike">
-                          <a:latin typeface="Calibri"/>
-                        </a:rPr>
-                        <a:t>0</a:t>
-                      </a:r>
-                      <a:endParaRPr b="0" lang="es-AR" sz="1200" spc="-1" strike="noStrike">
-                        <a:latin typeface="Calibri"/>
-                      </a:endParaRPr>
-                    </a:p>
-                  </a:txBody>
-                  <a:tcPr marL="90000" marR="90000">
-                    <a:lnL w="720">
-                      <a:solidFill>
-                        <a:srgbClr val="000000"/>
-                      </a:solidFill>
-                    </a:lnL>
-                    <a:lnR w="720">
-                      <a:solidFill>
-                        <a:srgbClr val="000000"/>
-                      </a:solidFill>
-                    </a:lnR>
-                    <a:lnT w="720">
-                      <a:solidFill>
-                        <a:srgbClr val="000000"/>
-                      </a:solidFill>
-                    </a:lnT>
-                    <a:lnB w="720">
-                      <a:solidFill>
-                        <a:srgbClr val="000000"/>
-                      </a:solidFill>
-                    </a:lnB>
-                    <a:noFill/>
-                  </a:tcPr>
-                </a:tc>
-                <a:tc>
-                  <a:txBody>
-                    <a:bodyPr lIns="90000" rIns="90000" tIns="46800" bIns="46800" anchor="ctr">
-                      <a:noAutofit/>
-                    </a:bodyPr>
-                    <a:p>
-                      <a:pPr algn="ctr"/>
-                      <a:r>
-                        <a:rPr b="0" lang="es-AR" sz="1200" spc="-1" strike="noStrike">
-                          <a:latin typeface="Calibri"/>
-                        </a:rPr>
-                        <a:t>Artículos particulares</a:t>
-                      </a:r>
-                      <a:endParaRPr b="0" lang="es-AR" sz="1200" spc="-1" strike="noStrike">
-                        <a:latin typeface="Calibri"/>
-                      </a:endParaRPr>
-                    </a:p>
-                  </a:txBody>
-                  <a:tcPr marL="90000" marR="90000">
-                    <a:lnL w="720">
-                      <a:solidFill>
-                        <a:srgbClr val="000000"/>
-                      </a:solidFill>
-                    </a:lnL>
-                    <a:lnR w="720">
-                      <a:solidFill>
-                        <a:srgbClr val="000000"/>
-                      </a:solidFill>
-                    </a:lnR>
-                    <a:lnT w="720">
-                      <a:solidFill>
-                        <a:srgbClr val="000000"/>
-                      </a:solidFill>
-                    </a:lnT>
-                    <a:lnB w="720">
-                      <a:solidFill>
-                        <a:srgbClr val="000000"/>
-                      </a:solidFill>
-                    </a:lnB>
-                    <a:noFill/>
-                  </a:tcPr>
-                </a:tc>
-              </a:tr>
-              <a:tr h="299880">
-                <a:tc>
-                  <a:txBody>
-                    <a:bodyPr lIns="90000" rIns="90000" tIns="46800" bIns="46800" anchor="ctr">
-                      <a:noAutofit/>
-                    </a:bodyPr>
-                    <a:p>
-                      <a:pPr algn="ctr"/>
-                      <a:r>
-                        <a:rPr b="0" lang="es-AR" sz="1200" spc="-1" strike="noStrike">
-                          <a:latin typeface="Calibri"/>
-                        </a:rPr>
-                        <a:t>Oficina</a:t>
-                      </a:r>
-                      <a:endParaRPr b="0" lang="es-AR" sz="1200" spc="-1" strike="noStrike">
-                        <a:latin typeface="Calibri"/>
-                      </a:endParaRPr>
-                    </a:p>
-                  </a:txBody>
-                  <a:tcPr marL="90000" marR="90000">
-                    <a:lnL w="720">
-                      <a:solidFill>
-                        <a:srgbClr val="000000"/>
-                      </a:solidFill>
-                    </a:lnL>
-                    <a:lnR w="720">
-                      <a:solidFill>
-                        <a:srgbClr val="000000"/>
-                      </a:solidFill>
-                    </a:lnR>
-                    <a:lnT w="720">
-                      <a:solidFill>
-                        <a:srgbClr val="000000"/>
-                      </a:solidFill>
-                    </a:lnT>
-                    <a:lnB w="720">
-                      <a:solidFill>
-                        <a:srgbClr val="000000"/>
-                      </a:solidFill>
-                    </a:lnB>
-                    <a:noFill/>
-                  </a:tcPr>
-                </a:tc>
-                <a:tc>
-                  <a:txBody>
-                    <a:bodyPr lIns="90000" rIns="90000" tIns="46800" bIns="46800" anchor="ctr">
-                      <a:noAutofit/>
-                    </a:bodyPr>
-                    <a:p>
-                      <a:pPr algn="ctr"/>
-                      <a:r>
-                        <a:rPr b="0" lang="es-AR" sz="1200" spc="-1" strike="noStrike">
-                          <a:latin typeface="Calibri"/>
-                        </a:rPr>
-                        <a:t>21%</a:t>
-                      </a:r>
-                      <a:endParaRPr b="0" lang="es-AR" sz="1200" spc="-1" strike="noStrike">
-                        <a:latin typeface="Calibri"/>
-                      </a:endParaRPr>
-                    </a:p>
-                  </a:txBody>
-                  <a:tcPr marL="90000" marR="90000">
-                    <a:lnL w="720">
-                      <a:solidFill>
-                        <a:srgbClr val="000000"/>
-                      </a:solidFill>
-                    </a:lnL>
-                    <a:lnR w="720">
-                      <a:solidFill>
-                        <a:srgbClr val="000000"/>
-                      </a:solidFill>
-                    </a:lnR>
-                    <a:lnT w="720">
-                      <a:solidFill>
-                        <a:srgbClr val="000000"/>
-                      </a:solidFill>
-                    </a:lnT>
-                    <a:lnB w="720">
-                      <a:solidFill>
-                        <a:srgbClr val="000000"/>
-                      </a:solidFill>
-                    </a:lnB>
-                    <a:noFill/>
-                  </a:tcPr>
-                </a:tc>
-                <a:tc>
-                  <a:txBody>
-                    <a:bodyPr lIns="90000" rIns="90000" tIns="46800" bIns="46800" anchor="ctr">
-                      <a:noAutofit/>
-                    </a:bodyPr>
-                    <a:p>
-                      <a:pPr algn="ctr"/>
-                      <a:r>
-                        <a:rPr b="0" lang="es-AR" sz="1200" spc="-1" strike="noStrike">
-                          <a:latin typeface="Calibri"/>
-                        </a:rPr>
-                        <a:t>Todos los artículos de oficina</a:t>
-                      </a:r>
-                      <a:endParaRPr b="0" lang="es-AR" sz="1200" spc="-1" strike="noStrike">
-                        <a:latin typeface="Calibri"/>
-                      </a:endParaRPr>
-                    </a:p>
-                  </a:txBody>
-                  <a:tcPr marL="90000" marR="90000">
-                    <a:lnL w="720">
-                      <a:solidFill>
-                        <a:srgbClr val="000000"/>
-                      </a:solidFill>
-                    </a:lnL>
-                    <a:lnR w="720">
-                      <a:solidFill>
-                        <a:srgbClr val="000000"/>
-                      </a:solidFill>
-                    </a:lnR>
-                    <a:lnT w="720">
-                      <a:solidFill>
-                        <a:srgbClr val="000000"/>
-                      </a:solidFill>
-                    </a:lnT>
-                    <a:lnB w="720">
-                      <a:solidFill>
-                        <a:srgbClr val="000000"/>
-                      </a:solidFill>
-                    </a:lnB>
-                    <a:noFill/>
-                  </a:tcPr>
-                </a:tc>
-              </a:tr>
-            </a:tbl>
-          </a:graphicData>
-        </a:graphic>
-      </p:graphicFrame>
+              <a:rPr b="0" lang="es-AR" sz="2400" spc="-1" strike="noStrike">
+                <a:latin typeface="Times New Roman"/>
+                <a:hlinkClick r:id="rId2"/>
+              </a:rPr>
+              <a:t>Diagrama de Clases del Ejemplo</a:t>
+            </a:r>
+            <a:endParaRPr b="0" lang="es-AR" sz="2400" spc="-1" strike="noStrike">
+              <a:latin typeface="Times New Roman"/>
+            </a:endParaRPr>
+          </a:p>
+        </p:txBody>
+      </p:sp>
     </p:spTree>
   </p:cSld>
   <mc:AlternateContent>
@@ -3468,7 +3014,7 @@
         <p:spPr>
           <a:xfrm>
             <a:off x="216000" y="216000"/>
-            <a:ext cx="8855640" cy="363960"/>
+            <a:ext cx="8854920" cy="363960"/>
           </a:xfrm>
           <a:prstGeom prst="rect">
             <a:avLst/>
@@ -3496,7 +3042,11 @@
             </a:pPr>
             <a:r>
               <a:rPr b="0" lang="es-AR" sz="1800" spc="-1" strike="noStrike">
-                <a:latin typeface="Arial"/>
+                <a:solidFill>
+                  <a:srgbClr val="000000"/>
+                </a:solidFill>
+                <a:latin typeface="Arial"/>
+                <a:ea typeface="DejaVu Sans"/>
               </a:rPr>
               <a:t>INGENIERÍA DE SOFTWARE II – Ing. En Sistemas de Información</a:t>
             </a:r>
@@ -3519,7 +3069,7 @@
         <p:spPr>
           <a:xfrm>
             <a:off x="9000000" y="144000"/>
-            <a:ext cx="722520" cy="722520"/>
+            <a:ext cx="721800" cy="721800"/>
           </a:xfrm>
           <a:prstGeom prst="rect">
             <a:avLst/>
@@ -3538,7 +3088,7 @@
         <p:spPr>
           <a:xfrm>
             <a:off x="360000" y="1080000"/>
-            <a:ext cx="9287640" cy="2833560"/>
+            <a:ext cx="9286920" cy="2832840"/>
           </a:xfrm>
           <a:prstGeom prst="rect">
             <a:avLst/>
@@ -3566,7 +3116,11 @@
             </a:pPr>
             <a:r>
               <a:rPr b="1" lang="es-AR" sz="1800" spc="-1" strike="noStrike">
-                <a:latin typeface="Arial"/>
+                <a:solidFill>
+                  <a:srgbClr val="000000"/>
+                </a:solidFill>
+                <a:latin typeface="Arial"/>
+                <a:ea typeface="DejaVu Sans"/>
               </a:rPr>
               <a:t>VENTAJAS</a:t>
             </a:r>
@@ -3582,7 +3136,11 @@
             </a:pPr>
             <a:r>
               <a:rPr b="0" lang="es-AR" sz="1800" spc="-1" strike="noStrike">
-                <a:latin typeface="Arial"/>
+                <a:solidFill>
+                  <a:srgbClr val="000000"/>
+                </a:solidFill>
+                <a:latin typeface="Arial"/>
+                <a:ea typeface="DejaVu Sans"/>
               </a:rPr>
               <a:t>- Flexibilidad de uso</a:t>
             </a:r>
@@ -3598,7 +3156,11 @@
             </a:pPr>
             <a:r>
               <a:rPr b="0" lang="es-AR" sz="1800" spc="-1" strike="noStrike">
-                <a:latin typeface="Arial"/>
+                <a:solidFill>
+                  <a:srgbClr val="000000"/>
+                </a:solidFill>
+                <a:latin typeface="Arial"/>
+                <a:ea typeface="DejaVu Sans"/>
               </a:rPr>
               <a:t>- Mantenibilidad y legibilidad del código</a:t>
             </a:r>
@@ -3614,7 +3176,11 @@
             </a:pPr>
             <a:r>
               <a:rPr b="0" lang="es-AR" sz="1800" spc="-1" strike="noStrike">
-                <a:latin typeface="Arial"/>
+                <a:solidFill>
+                  <a:srgbClr val="000000"/>
+                </a:solidFill>
+                <a:latin typeface="Arial"/>
+                <a:ea typeface="DejaVu Sans"/>
               </a:rPr>
               <a:t>- Facilita la conexión entre jerarquías</a:t>
             </a:r>
@@ -3640,7 +3206,11 @@
             </a:pPr>
             <a:r>
               <a:rPr b="1" lang="es-AR" sz="1800" spc="-1" strike="noStrike">
-                <a:latin typeface="Arial"/>
+                <a:solidFill>
+                  <a:srgbClr val="000000"/>
+                </a:solidFill>
+                <a:latin typeface="Arial"/>
+                <a:ea typeface="DejaVu Sans"/>
               </a:rPr>
               <a:t>DESVENTAJAS</a:t>
             </a:r>
@@ -3656,7 +3226,11 @@
             </a:pPr>
             <a:r>
               <a:rPr b="0" lang="es-AR" sz="1800" spc="-1" strike="noStrike">
-                <a:latin typeface="Arial"/>
+                <a:solidFill>
+                  <a:srgbClr val="000000"/>
+                </a:solidFill>
+                <a:latin typeface="Arial"/>
+                <a:ea typeface="DejaVu Sans"/>
               </a:rPr>
               <a:t>- Obliga a definir subclases de la clase Creator</a:t>
             </a:r>
@@ -3692,7 +3266,11 @@
             </a:pPr>
             <a:r>
               <a:rPr b="0" lang="es-AR" sz="1800" spc="-1" strike="noStrike">
-                <a:latin typeface="Arial"/>
+                <a:solidFill>
+                  <a:srgbClr val="000000"/>
+                </a:solidFill>
+                <a:latin typeface="Arial"/>
+                <a:ea typeface="DejaVu Sans"/>
               </a:rPr>
               <a:t>Está relacionado con los patrones Singleton y Prototype</a:t>
             </a:r>
@@ -3768,7 +3346,7 @@
         <p:spPr>
           <a:xfrm>
             <a:off x="216000" y="216000"/>
-            <a:ext cx="8855640" cy="363960"/>
+            <a:ext cx="8854920" cy="363960"/>
           </a:xfrm>
           <a:prstGeom prst="rect">
             <a:avLst/>
@@ -3796,7 +3374,11 @@
             </a:pPr>
             <a:r>
               <a:rPr b="0" lang="es-AR" sz="1800" spc="-1" strike="noStrike">
-                <a:latin typeface="Arial"/>
+                <a:solidFill>
+                  <a:srgbClr val="000000"/>
+                </a:solidFill>
+                <a:latin typeface="Arial"/>
+                <a:ea typeface="DejaVu Sans"/>
               </a:rPr>
               <a:t>INGENIERÍA DE SOFTWARE II – Ing. En Sistemas de Información</a:t>
             </a:r>
@@ -3819,7 +3401,7 @@
         <p:spPr>
           <a:xfrm>
             <a:off x="9000000" y="144000"/>
-            <a:ext cx="722520" cy="722520"/>
+            <a:ext cx="721800" cy="721800"/>
           </a:xfrm>
           <a:prstGeom prst="rect">
             <a:avLst/>
@@ -3838,7 +3420,7 @@
         <p:spPr>
           <a:xfrm>
             <a:off x="360000" y="1080000"/>
-            <a:ext cx="9287640" cy="3382200"/>
+            <a:ext cx="9286920" cy="3381480"/>
           </a:xfrm>
           <a:prstGeom prst="rect">
             <a:avLst/>
@@ -3866,7 +3448,11 @@
             </a:pPr>
             <a:r>
               <a:rPr b="1" lang="es-AR" sz="1800" spc="-1" strike="noStrike">
-                <a:latin typeface="Arial"/>
+                <a:solidFill>
+                  <a:srgbClr val="000000"/>
+                </a:solidFill>
+                <a:latin typeface="Arial"/>
+                <a:ea typeface="DejaVu Sans"/>
               </a:rPr>
               <a:t>Algunos ejemplos de uso pueden ser</a:t>
             </a:r>
@@ -3902,7 +3488,11 @@
             </a:pPr>
             <a:r>
               <a:rPr b="0" lang="es-AR" sz="1800" spc="-1" strike="noStrike">
-                <a:latin typeface="Arial"/>
+                <a:solidFill>
+                  <a:srgbClr val="000000"/>
+                </a:solidFill>
+                <a:latin typeface="Arial"/>
+                <a:ea typeface="DejaVu Sans"/>
               </a:rPr>
               <a:t>1- En los call-center, los representantes de servicio responden las quejas de los clientes desde una aplicación de escritorio hecha en .NET y las respuestas son enviadas a diferentes fuentes (Un chat de Facebook, un Tweet, un msj de Instagram, etc.).</a:t>
             </a:r>
@@ -3928,7 +3518,11 @@
             </a:pPr>
             <a:r>
               <a:rPr b="0" lang="es-AR" sz="1800" spc="-1" strike="noStrike">
-                <a:latin typeface="Arial"/>
+                <a:solidFill>
+                  <a:srgbClr val="000000"/>
+                </a:solidFill>
+                <a:latin typeface="Arial"/>
+                <a:ea typeface="DejaVu Sans"/>
               </a:rPr>
               <a:t>2- En el cálculo del IVA de una factura, la factoría instancia la forma de cálculo en función al tipo de contribuyente que se factura, en tipo de ejecución.</a:t>
             </a:r>
@@ -3954,7 +3548,11 @@
             </a:pPr>
             <a:r>
               <a:rPr b="0" lang="es-AR" sz="1800" spc="-1" strike="noStrike">
-                <a:latin typeface="Arial"/>
+                <a:solidFill>
+                  <a:srgbClr val="000000"/>
+                </a:solidFill>
+                <a:latin typeface="Arial"/>
+                <a:ea typeface="DejaVu Sans"/>
               </a:rPr>
               <a:t>3- La generación del sistema se realiza en el dispositivo correspondiente según el tipo de contribuyente en tiempo de ejecución (factura electrónica, impresora fiscal, etc).</a:t>
             </a:r>
@@ -4030,7 +3628,7 @@
         <p:spPr>
           <a:xfrm>
             <a:off x="216000" y="216000"/>
-            <a:ext cx="8855640" cy="363960"/>
+            <a:ext cx="8854920" cy="363960"/>
           </a:xfrm>
           <a:prstGeom prst="rect">
             <a:avLst/>
@@ -4058,7 +3656,11 @@
             </a:pPr>
             <a:r>
               <a:rPr b="0" lang="es-AR" sz="1800" spc="-1" strike="noStrike">
-                <a:latin typeface="Arial"/>
+                <a:solidFill>
+                  <a:srgbClr val="000000"/>
+                </a:solidFill>
+                <a:latin typeface="Arial"/>
+                <a:ea typeface="DejaVu Sans"/>
               </a:rPr>
               <a:t>INGENIERÍA DE SOFTWARE II – Ing. En Sistemas de Información</a:t>
             </a:r>
@@ -4081,7 +3683,7 @@
         <p:spPr>
           <a:xfrm>
             <a:off x="9000000" y="144000"/>
-            <a:ext cx="722520" cy="722520"/>
+            <a:ext cx="721800" cy="721800"/>
           </a:xfrm>
           <a:prstGeom prst="rect">
             <a:avLst/>
@@ -4100,7 +3702,7 @@
         <p:spPr>
           <a:xfrm>
             <a:off x="360000" y="1080000"/>
-            <a:ext cx="9287640" cy="2284920"/>
+            <a:ext cx="9286920" cy="3257640"/>
           </a:xfrm>
           <a:prstGeom prst="rect">
             <a:avLst/>
@@ -4127,95 +3729,157 @@
               </a:lnSpc>
             </a:pPr>
             <a:r>
-              <a:rPr b="1" lang="es-AR" sz="1800" spc="-1" strike="noStrike">
-                <a:latin typeface="Arial"/>
+              <a:rPr b="1" lang="es-AR" sz="2600" spc="-1" strike="noStrike">
+                <a:solidFill>
+                  <a:srgbClr val="000000"/>
+                </a:solidFill>
+                <a:latin typeface="Arial"/>
+                <a:ea typeface="DejaVu Sans"/>
               </a:rPr>
               <a:t>PREGUNTAS??</a:t>
             </a:r>
-            <a:endParaRPr b="0" lang="es-AR" sz="1800" spc="-1" strike="noStrike">
-              <a:latin typeface="Arial"/>
-            </a:endParaRPr>
-          </a:p>
-          <a:p>
-            <a:pPr>
-              <a:lnSpc>
-                <a:spcPct val="100000"/>
-              </a:lnSpc>
-            </a:pPr>
-            <a:endParaRPr b="0" lang="es-AR" sz="1800" spc="-1" strike="noStrike">
-              <a:latin typeface="Arial"/>
-            </a:endParaRPr>
-          </a:p>
-          <a:p>
-            <a:pPr>
-              <a:lnSpc>
-                <a:spcPct val="100000"/>
-              </a:lnSpc>
-            </a:pPr>
-            <a:endParaRPr b="0" lang="es-AR" sz="1800" spc="-1" strike="noStrike">
-              <a:latin typeface="Arial"/>
-            </a:endParaRPr>
-          </a:p>
-          <a:p>
-            <a:pPr>
-              <a:lnSpc>
-                <a:spcPct val="100000"/>
-              </a:lnSpc>
-            </a:pPr>
-            <a:endParaRPr b="0" lang="es-AR" sz="1800" spc="-1" strike="noStrike">
-              <a:latin typeface="Arial"/>
-            </a:endParaRPr>
-          </a:p>
-          <a:p>
-            <a:pPr>
-              <a:lnSpc>
-                <a:spcPct val="100000"/>
-              </a:lnSpc>
-            </a:pPr>
-            <a:r>
-              <a:rPr b="1" lang="es-AR" sz="1800" spc="-1" strike="noStrike">
-                <a:latin typeface="Arial"/>
+            <a:endParaRPr b="0" lang="es-AR" sz="2600" spc="-1" strike="noStrike">
+              <a:latin typeface="Arial"/>
+            </a:endParaRPr>
+          </a:p>
+          <a:p>
+            <a:pPr>
+              <a:lnSpc>
+                <a:spcPct val="100000"/>
+              </a:lnSpc>
+            </a:pPr>
+            <a:endParaRPr b="0" lang="es-AR" sz="2600" spc="-1" strike="noStrike">
+              <a:latin typeface="Arial"/>
+            </a:endParaRPr>
+          </a:p>
+          <a:p>
+            <a:pPr>
+              <a:lnSpc>
+                <a:spcPct val="100000"/>
+              </a:lnSpc>
+            </a:pPr>
+            <a:endParaRPr b="0" lang="es-AR" sz="2600" spc="-1" strike="noStrike">
+              <a:latin typeface="Arial"/>
+            </a:endParaRPr>
+          </a:p>
+          <a:p>
+            <a:pPr>
+              <a:lnSpc>
+                <a:spcPct val="100000"/>
+              </a:lnSpc>
+            </a:pPr>
+            <a:endParaRPr b="0" lang="es-AR" sz="2600" spc="-1" strike="noStrike">
+              <a:latin typeface="Arial"/>
+            </a:endParaRPr>
+          </a:p>
+          <a:p>
+            <a:pPr>
+              <a:lnSpc>
+                <a:spcPct val="100000"/>
+              </a:lnSpc>
+            </a:pPr>
+            <a:r>
+              <a:rPr b="1" lang="es-AR" sz="2600" spc="-1" strike="noStrike">
+                <a:solidFill>
+                  <a:srgbClr val="000000"/>
+                </a:solidFill>
+                <a:latin typeface="Arial"/>
+                <a:ea typeface="DejaVu Sans"/>
               </a:rPr>
               <a:t>MUCHAS GRACIAS!!</a:t>
             </a:r>
-            <a:endParaRPr b="0" lang="es-AR" sz="1800" spc="-1" strike="noStrike">
-              <a:latin typeface="Arial"/>
-            </a:endParaRPr>
-          </a:p>
-          <a:p>
-            <a:pPr>
-              <a:lnSpc>
-                <a:spcPct val="100000"/>
-              </a:lnSpc>
-            </a:pPr>
-            <a:endParaRPr b="0" lang="es-AR" sz="1800" spc="-1" strike="noStrike">
-              <a:latin typeface="Arial"/>
-            </a:endParaRPr>
-          </a:p>
-          <a:p>
-            <a:pPr>
-              <a:lnSpc>
-                <a:spcPct val="100000"/>
-              </a:lnSpc>
-            </a:pPr>
-            <a:endParaRPr b="0" lang="es-AR" sz="1800" spc="-1" strike="noStrike">
-              <a:latin typeface="Arial"/>
-            </a:endParaRPr>
-          </a:p>
-          <a:p>
-            <a:pPr>
-              <a:lnSpc>
-                <a:spcPct val="100000"/>
-              </a:lnSpc>
-            </a:pPr>
-            <a:r>
-              <a:rPr b="1" lang="es-AR" sz="1800" spc="-1" strike="noStrike">
-                <a:latin typeface="Arial"/>
-              </a:rPr>
-              <a:t>:-)</a:t>
-            </a:r>
-            <a:endParaRPr b="0" lang="es-AR" sz="1800" spc="-1" strike="noStrike">
-              <a:latin typeface="Arial"/>
+            <a:endParaRPr b="0" lang="es-AR" sz="2600" spc="-1" strike="noStrike">
+              <a:latin typeface="Arial"/>
+            </a:endParaRPr>
+          </a:p>
+          <a:p>
+            <a:pPr>
+              <a:lnSpc>
+                <a:spcPct val="100000"/>
+              </a:lnSpc>
+            </a:pPr>
+            <a:endParaRPr b="0" lang="es-AR" sz="2600" spc="-1" strike="noStrike">
+              <a:latin typeface="Arial"/>
+            </a:endParaRPr>
+          </a:p>
+          <a:p>
+            <a:pPr>
+              <a:lnSpc>
+                <a:spcPct val="100000"/>
+              </a:lnSpc>
+            </a:pPr>
+            <a:endParaRPr b="0" lang="es-AR" sz="2600" spc="-1" strike="noStrike">
+              <a:latin typeface="Arial"/>
+            </a:endParaRPr>
+          </a:p>
+          <a:p>
+            <a:pPr>
+              <a:lnSpc>
+                <a:spcPct val="100000"/>
+              </a:lnSpc>
+            </a:pPr>
+            <a:endParaRPr b="0" lang="es-AR" sz="2600" spc="-1" strike="noStrike">
+              <a:latin typeface="Arial"/>
+            </a:endParaRPr>
+          </a:p>
+        </p:txBody>
+      </p:sp>
+      <p:pic>
+        <p:nvPicPr>
+          <p:cNvPr id="102" name="" descr=""/>
+          <p:cNvPicPr/>
+          <p:nvPr/>
+        </p:nvPicPr>
+        <p:blipFill>
+          <a:blip r:embed="rId2"/>
+          <a:stretch/>
+        </p:blipFill>
+        <p:spPr>
+          <a:xfrm>
+            <a:off x="5184000" y="1521720"/>
+            <a:ext cx="4210560" cy="3157920"/>
+          </a:xfrm>
+          <a:prstGeom prst="rect">
+            <a:avLst/>
+          </a:prstGeom>
+          <a:ln>
+            <a:noFill/>
+          </a:ln>
+        </p:spPr>
+      </p:pic>
+      <p:sp>
+        <p:nvSpPr>
+          <p:cNvPr id="103" name="TextShape 3"/>
+          <p:cNvSpPr txBox="1"/>
+          <p:nvPr/>
+        </p:nvSpPr>
+        <p:spPr>
+          <a:xfrm>
+            <a:off x="2016000" y="5015880"/>
+            <a:ext cx="6120000" cy="456120"/>
+          </a:xfrm>
+          <a:prstGeom prst="rect">
+            <a:avLst/>
+          </a:prstGeom>
+          <a:noFill/>
+          <a:ln>
+            <a:noFill/>
+          </a:ln>
+        </p:spPr>
+        <p:txBody>
+          <a:bodyPr lIns="90000" rIns="90000" tIns="45000" bIns="45000">
+            <a:spAutoFit/>
+          </a:bodyPr>
+          <a:p>
+            <a:r>
+              <a:rPr b="0" lang="es-AR" sz="2400" spc="-1" strike="noStrike">
+                <a:latin typeface="Times New Roman"/>
+                <a:hlinkClick r:id="rId3"/>
+              </a:rPr>
+              <a:t>https://github.com/fabiodmk/factorypatternjava</a:t>
+            </a:r>
+            <a:endParaRPr b="0" lang="es-AR" sz="2400" spc="-1" strike="noStrike">
+              <a:latin typeface="Times New Roman"/>
             </a:endParaRPr>
           </a:p>
         </p:txBody>
@@ -4286,7 +3950,7 @@
         <p:spPr>
           <a:xfrm>
             <a:off x="216000" y="216000"/>
-            <a:ext cx="8855640" cy="363960"/>
+            <a:ext cx="8854920" cy="363960"/>
           </a:xfrm>
           <a:prstGeom prst="rect">
             <a:avLst/>
@@ -4314,7 +3978,11 @@
             </a:pPr>
             <a:r>
               <a:rPr b="0" lang="es-AR" sz="1800" spc="-1" strike="noStrike">
-                <a:latin typeface="Arial"/>
+                <a:solidFill>
+                  <a:srgbClr val="000000"/>
+                </a:solidFill>
+                <a:latin typeface="Arial"/>
+                <a:ea typeface="DejaVu Sans"/>
               </a:rPr>
               <a:t>INGENIERÍA DE SOFTWARE II – Ing. En Sistemas de Información</a:t>
             </a:r>
@@ -4337,7 +4005,7 @@
         <p:spPr>
           <a:xfrm>
             <a:off x="9000000" y="144000"/>
-            <a:ext cx="722520" cy="722520"/>
+            <a:ext cx="721800" cy="721800"/>
           </a:xfrm>
           <a:prstGeom prst="rect">
             <a:avLst/>
@@ -4356,7 +4024,7 @@
         <p:spPr>
           <a:xfrm>
             <a:off x="360000" y="1080000"/>
-            <a:ext cx="9215640" cy="4446720"/>
+            <a:ext cx="9214920" cy="4446720"/>
           </a:xfrm>
           <a:prstGeom prst="rect">
             <a:avLst/>
@@ -4384,7 +4052,11 @@
             </a:pPr>
             <a:r>
               <a:rPr b="1" lang="es-AR" sz="2200" spc="-1" strike="noStrike">
-                <a:latin typeface="Arial"/>
+                <a:solidFill>
+                  <a:srgbClr val="000000"/>
+                </a:solidFill>
+                <a:latin typeface="Arial"/>
+                <a:ea typeface="DejaVu Sans"/>
               </a:rPr>
               <a:t>Patrón Factory</a:t>
             </a:r>
@@ -4410,13 +4082,21 @@
             </a:pPr>
             <a:r>
               <a:rPr b="1" lang="es-AR" sz="2200" spc="-1" strike="noStrike">
-                <a:latin typeface="Arial"/>
+                <a:solidFill>
+                  <a:srgbClr val="000000"/>
+                </a:solidFill>
+                <a:latin typeface="Arial"/>
+                <a:ea typeface="DejaVu Sans"/>
               </a:rPr>
               <a:t>- Problema que resuelve: </a:t>
             </a:r>
             <a:r>
               <a:rPr b="0" lang="es-AR" sz="2200" spc="-1" strike="noStrike">
-                <a:latin typeface="Arial"/>
+                <a:solidFill>
+                  <a:srgbClr val="000000"/>
+                </a:solidFill>
+                <a:latin typeface="Arial"/>
+                <a:ea typeface="DejaVu Sans"/>
               </a:rPr>
               <a:t>en ocasiones, no se puede saber con anticipación el tipo de objeto a instanciar o el método a invocar.</a:t>
             </a:r>
@@ -4432,7 +4112,11 @@
             </a:pPr>
             <a:r>
               <a:rPr b="0" lang="es-AR" sz="2200" spc="-1" strike="noStrike">
-                <a:latin typeface="Arial"/>
+                <a:solidFill>
+                  <a:srgbClr val="000000"/>
+                </a:solidFill>
+                <a:latin typeface="Arial"/>
+                <a:ea typeface="DejaVu Sans"/>
               </a:rPr>
               <a:t>Se trata de un patrón creacional con dos variantes según si es de clase o de objeto.</a:t>
             </a:r>
@@ -4458,13 +4142,21 @@
             </a:pPr>
             <a:r>
               <a:rPr b="1" lang="es-AR" sz="2200" spc="-1" strike="noStrike">
-                <a:latin typeface="Arial"/>
+                <a:solidFill>
+                  <a:srgbClr val="000000"/>
+                </a:solidFill>
+                <a:latin typeface="Arial"/>
+                <a:ea typeface="DejaVu Sans"/>
               </a:rPr>
               <a:t>- Solución: </a:t>
             </a:r>
             <a:r>
               <a:rPr b="0" lang="es-AR" sz="2200" spc="-1" strike="noStrike">
-                <a:latin typeface="Arial"/>
+                <a:solidFill>
+                  <a:srgbClr val="000000"/>
+                </a:solidFill>
+                <a:latin typeface="Arial"/>
+                <a:ea typeface="DejaVu Sans"/>
               </a:rPr>
               <a:t>delegar a una clase (la factoría) la responsabilidad de crear los objetos o llamar al método en cuestión.</a:t>
             </a:r>
@@ -4490,7 +4182,11 @@
             </a:pPr>
             <a:r>
               <a:rPr b="1" lang="es-AR" sz="2200" spc="-1" strike="noStrike">
-                <a:latin typeface="Arial"/>
+                <a:solidFill>
+                  <a:srgbClr val="000000"/>
+                </a:solidFill>
+                <a:latin typeface="Arial"/>
+                <a:ea typeface="DejaVu Sans"/>
               </a:rPr>
               <a:t>- Variantes</a:t>
             </a:r>
@@ -4506,7 +4202,11 @@
             </a:pPr>
             <a:r>
               <a:rPr b="0" lang="es-AR" sz="2200" spc="-1" strike="noStrike">
-                <a:latin typeface="Arial"/>
+                <a:solidFill>
+                  <a:srgbClr val="000000"/>
+                </a:solidFill>
+                <a:latin typeface="Arial"/>
+                <a:ea typeface="DejaVu Sans"/>
               </a:rPr>
               <a:t>a. Factory method (Clase)</a:t>
             </a:r>
@@ -4522,7 +4222,11 @@
             </a:pPr>
             <a:r>
               <a:rPr b="0" lang="es-AR" sz="2200" spc="-1" strike="noStrike">
-                <a:latin typeface="Arial"/>
+                <a:solidFill>
+                  <a:srgbClr val="000000"/>
+                </a:solidFill>
+                <a:latin typeface="Arial"/>
+                <a:ea typeface="DejaVu Sans"/>
               </a:rPr>
               <a:t>b. Abstract Factory (Objeto)</a:t>
             </a:r>
@@ -4598,7 +4302,7 @@
         <p:spPr>
           <a:xfrm>
             <a:off x="216000" y="216000"/>
-            <a:ext cx="8855640" cy="363960"/>
+            <a:ext cx="8854920" cy="363960"/>
           </a:xfrm>
           <a:prstGeom prst="rect">
             <a:avLst/>
@@ -4626,7 +4330,11 @@
             </a:pPr>
             <a:r>
               <a:rPr b="0" lang="es-AR" sz="1800" spc="-1" strike="noStrike">
-                <a:latin typeface="Arial"/>
+                <a:solidFill>
+                  <a:srgbClr val="000000"/>
+                </a:solidFill>
+                <a:latin typeface="Arial"/>
+                <a:ea typeface="DejaVu Sans"/>
               </a:rPr>
               <a:t>INGENIERÍA DE SOFTWARE II – Ing. En Sistemas de Información</a:t>
             </a:r>
@@ -4649,7 +4357,7 @@
         <p:spPr>
           <a:xfrm>
             <a:off x="9000000" y="144000"/>
-            <a:ext cx="722520" cy="722520"/>
+            <a:ext cx="721800" cy="721800"/>
           </a:xfrm>
           <a:prstGeom prst="rect">
             <a:avLst/>
@@ -4668,7 +4376,7 @@
         <p:spPr>
           <a:xfrm>
             <a:off x="360000" y="720000"/>
-            <a:ext cx="6191640" cy="364680"/>
+            <a:ext cx="6190920" cy="363960"/>
           </a:xfrm>
           <a:prstGeom prst="rect">
             <a:avLst/>
@@ -4696,7 +4404,11 @@
             </a:pPr>
             <a:r>
               <a:rPr b="1" lang="es-AR" sz="1800" spc="-1" strike="noStrike">
-                <a:latin typeface="Arial"/>
+                <a:solidFill>
+                  <a:srgbClr val="000000"/>
+                </a:solidFill>
+                <a:latin typeface="Arial"/>
+                <a:ea typeface="DejaVu Sans"/>
               </a:rPr>
               <a:t>Problema</a:t>
             </a:r>
@@ -4715,7 +4427,7 @@
         <p:spPr>
           <a:xfrm>
             <a:off x="504000" y="1322280"/>
-            <a:ext cx="9143640" cy="363960"/>
+            <a:ext cx="9142920" cy="363960"/>
           </a:xfrm>
           <a:prstGeom prst="rect">
             <a:avLst/>
@@ -4743,7 +4455,11 @@
             </a:pPr>
             <a:r>
               <a:rPr b="0" lang="es-AR" sz="1800" spc="-1" strike="noStrike">
-                <a:latin typeface="Arial"/>
+                <a:solidFill>
+                  <a:srgbClr val="000000"/>
+                </a:solidFill>
+                <a:latin typeface="Arial"/>
+                <a:ea typeface="DejaVu Sans"/>
               </a:rPr>
               <a:t>Caso de tipos de triángulos</a:t>
             </a:r>
@@ -4762,7 +4478,7 @@
         <p:spPr>
           <a:xfrm>
             <a:off x="1224000" y="2664000"/>
-            <a:ext cx="1007640" cy="863640"/>
+            <a:ext cx="1006920" cy="862920"/>
           </a:xfrm>
           <a:custGeom>
             <a:avLst/>
@@ -4811,7 +4527,7 @@
         <p:spPr>
           <a:xfrm>
             <a:off x="4032000" y="1944000"/>
-            <a:ext cx="2159640" cy="791640"/>
+            <a:ext cx="2158920" cy="790920"/>
           </a:xfrm>
           <a:custGeom>
             <a:avLst/>
@@ -4858,7 +4574,7 @@
         <p:spPr>
           <a:xfrm>
             <a:off x="4392000" y="3168000"/>
-            <a:ext cx="1367640" cy="1007640"/>
+            <a:ext cx="1366920" cy="1006920"/>
           </a:xfrm>
           <a:custGeom>
             <a:avLst/>
@@ -4986,7 +4702,7 @@
         <p:spPr>
           <a:xfrm>
             <a:off x="1008000" y="3816000"/>
-            <a:ext cx="1655640" cy="363960"/>
+            <a:ext cx="1654920" cy="363960"/>
           </a:xfrm>
           <a:prstGeom prst="rect">
             <a:avLst/>
@@ -5014,7 +4730,11 @@
             </a:pPr>
             <a:r>
               <a:rPr b="0" lang="es-AR" sz="1800" spc="-1" strike="noStrike">
-                <a:latin typeface="Arial"/>
+                <a:solidFill>
+                  <a:srgbClr val="000000"/>
+                </a:solidFill>
+                <a:latin typeface="Arial"/>
+                <a:ea typeface="DejaVu Sans"/>
               </a:rPr>
               <a:t>TRIÁNGULO</a:t>
             </a:r>
@@ -5033,7 +4753,7 @@
         <p:spPr>
           <a:xfrm>
             <a:off x="6408000" y="2016000"/>
-            <a:ext cx="3239640" cy="3381480"/>
+            <a:ext cx="3238920" cy="3381480"/>
           </a:xfrm>
           <a:prstGeom prst="rect">
             <a:avLst/>
@@ -5061,7 +4781,11 @@
             </a:pPr>
             <a:r>
               <a:rPr b="0" lang="es-AR" sz="1800" spc="-1" strike="noStrike">
-                <a:latin typeface="Arial"/>
+                <a:solidFill>
+                  <a:srgbClr val="000000"/>
+                </a:solidFill>
+                <a:latin typeface="Arial"/>
+                <a:ea typeface="DejaVu Sans"/>
               </a:rPr>
               <a:t>ISÓSCELES (2 LADOS = )</a:t>
             </a:r>
@@ -5127,7 +4851,11 @@
             </a:pPr>
             <a:r>
               <a:rPr b="0" lang="es-AR" sz="1800" spc="-1" strike="noStrike">
-                <a:latin typeface="Arial"/>
+                <a:solidFill>
+                  <a:srgbClr val="000000"/>
+                </a:solidFill>
+                <a:latin typeface="Arial"/>
+                <a:ea typeface="DejaVu Sans"/>
               </a:rPr>
               <a:t>EQUILÁTERO (3 LADOS =)</a:t>
             </a:r>
@@ -5183,7 +4911,11 @@
             </a:pPr>
             <a:r>
               <a:rPr b="0" lang="es-AR" sz="1800" spc="-1" strike="noStrike">
-                <a:latin typeface="Arial"/>
+                <a:solidFill>
+                  <a:srgbClr val="000000"/>
+                </a:solidFill>
+                <a:latin typeface="Arial"/>
+                <a:ea typeface="DejaVu Sans"/>
               </a:rPr>
               <a:t>ESCALENO (3 LADOS !=)</a:t>
             </a:r>
@@ -5259,7 +4991,7 @@
         <p:spPr>
           <a:xfrm>
             <a:off x="216000" y="216000"/>
-            <a:ext cx="8855640" cy="363960"/>
+            <a:ext cx="8854920" cy="363960"/>
           </a:xfrm>
           <a:prstGeom prst="rect">
             <a:avLst/>
@@ -5287,7 +5019,11 @@
             </a:pPr>
             <a:r>
               <a:rPr b="0" lang="es-AR" sz="1800" spc="-1" strike="noStrike">
-                <a:latin typeface="Arial"/>
+                <a:solidFill>
+                  <a:srgbClr val="000000"/>
+                </a:solidFill>
+                <a:latin typeface="Arial"/>
+                <a:ea typeface="DejaVu Sans"/>
               </a:rPr>
               <a:t>INGENIERÍA DE SOFTWARE II – Ing. En Sistemas de Información</a:t>
             </a:r>
@@ -5310,7 +5046,7 @@
         <p:spPr>
           <a:xfrm>
             <a:off x="9000000" y="144000"/>
-            <a:ext cx="722520" cy="722520"/>
+            <a:ext cx="721800" cy="721800"/>
           </a:xfrm>
           <a:prstGeom prst="rect">
             <a:avLst/>
@@ -5329,7 +5065,7 @@
         <p:spPr>
           <a:xfrm>
             <a:off x="360000" y="720000"/>
-            <a:ext cx="6191640" cy="364680"/>
+            <a:ext cx="6190920" cy="363960"/>
           </a:xfrm>
           <a:prstGeom prst="rect">
             <a:avLst/>
@@ -5357,7 +5093,11 @@
             </a:pPr>
             <a:r>
               <a:rPr b="1" lang="es-AR" sz="1800" spc="-1" strike="noStrike">
-                <a:latin typeface="Arial"/>
+                <a:solidFill>
+                  <a:srgbClr val="000000"/>
+                </a:solidFill>
+                <a:latin typeface="Arial"/>
+                <a:ea typeface="DejaVu Sans"/>
               </a:rPr>
               <a:t>Diagrama de Clases Patrón Factory</a:t>
             </a:r>
@@ -5380,7 +5120,7 @@
         <p:spPr>
           <a:xfrm>
             <a:off x="1872000" y="1296000"/>
-            <a:ext cx="5903640" cy="3805920"/>
+            <a:ext cx="5902920" cy="3805200"/>
           </a:xfrm>
           <a:prstGeom prst="rect">
             <a:avLst/>
@@ -5456,7 +5196,7 @@
         <p:spPr>
           <a:xfrm>
             <a:off x="216000" y="216000"/>
-            <a:ext cx="8855640" cy="363960"/>
+            <a:ext cx="8854920" cy="363960"/>
           </a:xfrm>
           <a:prstGeom prst="rect">
             <a:avLst/>
@@ -5484,7 +5224,11 @@
             </a:pPr>
             <a:r>
               <a:rPr b="0" lang="es-AR" sz="1800" spc="-1" strike="noStrike">
-                <a:latin typeface="Arial"/>
+                <a:solidFill>
+                  <a:srgbClr val="000000"/>
+                </a:solidFill>
+                <a:latin typeface="Arial"/>
+                <a:ea typeface="DejaVu Sans"/>
               </a:rPr>
               <a:t>INGENIERÍA DE SOFTWARE II – Ing. En Sistemas de Información</a:t>
             </a:r>
@@ -5507,7 +5251,7 @@
         <p:spPr>
           <a:xfrm>
             <a:off x="9000000" y="144000"/>
-            <a:ext cx="722520" cy="722520"/>
+            <a:ext cx="721800" cy="721800"/>
           </a:xfrm>
           <a:prstGeom prst="rect">
             <a:avLst/>
@@ -5526,7 +5270,7 @@
         <p:spPr>
           <a:xfrm>
             <a:off x="360000" y="720000"/>
-            <a:ext cx="6191640" cy="364680"/>
+            <a:ext cx="6190920" cy="363960"/>
           </a:xfrm>
           <a:prstGeom prst="rect">
             <a:avLst/>
@@ -5554,7 +5298,11 @@
             </a:pPr>
             <a:r>
               <a:rPr b="1" lang="es-AR" sz="1800" spc="-1" strike="noStrike">
-                <a:latin typeface="Arial"/>
+                <a:solidFill>
+                  <a:srgbClr val="000000"/>
+                </a:solidFill>
+                <a:latin typeface="Arial"/>
+                <a:ea typeface="DejaVu Sans"/>
               </a:rPr>
               <a:t>Ejemplo del Problema</a:t>
             </a:r>
@@ -5573,7 +5321,7 @@
         <p:spPr>
           <a:xfrm>
             <a:off x="504000" y="1322280"/>
-            <a:ext cx="9143640" cy="2284200"/>
+            <a:ext cx="9142920" cy="2284200"/>
           </a:xfrm>
           <a:prstGeom prst="rect">
             <a:avLst/>
@@ -5601,7 +5349,11 @@
             </a:pPr>
             <a:r>
               <a:rPr b="0" lang="es-AR" sz="1800" spc="-1" strike="noStrike">
-                <a:latin typeface="Arial"/>
+                <a:solidFill>
+                  <a:srgbClr val="000000"/>
+                </a:solidFill>
+                <a:latin typeface="Arial"/>
+                <a:ea typeface="DejaVu Sans"/>
               </a:rPr>
               <a:t>Se requiere disponer de un creador de triángulos, que me cree el triángulo correspondiente en función a sus dimensiones (3 lados).</a:t>
             </a:r>
@@ -5637,13 +5389,21 @@
             </a:pPr>
             <a:r>
               <a:rPr b="1" lang="es-AR" sz="1800" spc="-1" strike="noStrike">
-                <a:latin typeface="Arial"/>
+                <a:solidFill>
+                  <a:srgbClr val="000000"/>
+                </a:solidFill>
+                <a:latin typeface="Arial"/>
+                <a:ea typeface="DejaVu Sans"/>
               </a:rPr>
               <a:t>Sin factory</a:t>
             </a:r>
             <a:r>
               <a:rPr b="0" lang="es-AR" sz="1800" spc="-1" strike="noStrike">
-                <a:latin typeface="Arial"/>
+                <a:solidFill>
+                  <a:srgbClr val="000000"/>
+                </a:solidFill>
+                <a:latin typeface="Arial"/>
+                <a:ea typeface="DejaVu Sans"/>
               </a:rPr>
               <a:t> → tengo que comparar los lados para saber que tipo de triángulo crear</a:t>
             </a:r>
@@ -5669,13 +5429,21 @@
             </a:pPr>
             <a:r>
               <a:rPr b="1" lang="es-AR" sz="1800" spc="-1" strike="noStrike">
-                <a:latin typeface="Arial"/>
+                <a:solidFill>
+                  <a:srgbClr val="000000"/>
+                </a:solidFill>
+                <a:latin typeface="Arial"/>
+                <a:ea typeface="DejaVu Sans"/>
               </a:rPr>
               <a:t>Con factory</a:t>
             </a:r>
             <a:r>
               <a:rPr b="0" lang="es-AR" sz="1800" spc="-1" strike="noStrike">
-                <a:latin typeface="Arial"/>
+                <a:solidFill>
+                  <a:srgbClr val="000000"/>
+                </a:solidFill>
+                <a:latin typeface="Arial"/>
+                <a:ea typeface="DejaVu Sans"/>
               </a:rPr>
               <a:t> → le pido a la factoría que me devuelva un triángulo. Ella sabe que tipo de triángulo según las dimensiones.</a:t>
             </a:r>
@@ -5751,7 +5519,7 @@
         <p:spPr>
           <a:xfrm>
             <a:off x="216000" y="216000"/>
-            <a:ext cx="8855640" cy="363960"/>
+            <a:ext cx="8854920" cy="363960"/>
           </a:xfrm>
           <a:prstGeom prst="rect">
             <a:avLst/>
@@ -5779,7 +5547,11 @@
             </a:pPr>
             <a:r>
               <a:rPr b="0" lang="es-AR" sz="1800" spc="-1" strike="noStrike">
-                <a:latin typeface="Arial"/>
+                <a:solidFill>
+                  <a:srgbClr val="000000"/>
+                </a:solidFill>
+                <a:latin typeface="Arial"/>
+                <a:ea typeface="DejaVu Sans"/>
               </a:rPr>
               <a:t>INGENIERÍA DE SOFTWARE II – Ing. En Sistemas de Información</a:t>
             </a:r>
@@ -5802,7 +5574,7 @@
         <p:spPr>
           <a:xfrm>
             <a:off x="9000000" y="144000"/>
-            <a:ext cx="722520" cy="722520"/>
+            <a:ext cx="721800" cy="721800"/>
           </a:xfrm>
           <a:prstGeom prst="rect">
             <a:avLst/>
@@ -5821,7 +5593,7 @@
         <p:spPr>
           <a:xfrm>
             <a:off x="360000" y="720000"/>
-            <a:ext cx="6191640" cy="364680"/>
+            <a:ext cx="6190920" cy="363960"/>
           </a:xfrm>
           <a:prstGeom prst="rect">
             <a:avLst/>
@@ -5849,7 +5621,11 @@
             </a:pPr>
             <a:r>
               <a:rPr b="1" lang="es-AR" sz="1800" spc="-1" strike="noStrike">
-                <a:latin typeface="Arial"/>
+                <a:solidFill>
+                  <a:srgbClr val="000000"/>
+                </a:solidFill>
+                <a:latin typeface="Arial"/>
+                <a:ea typeface="DejaVu Sans"/>
               </a:rPr>
               <a:t>Sin Factory            :-(</a:t>
             </a:r>
@@ -5872,7 +5648,7 @@
         <p:spPr>
           <a:xfrm>
             <a:off x="697680" y="1584000"/>
-            <a:ext cx="8590320" cy="3233160"/>
+            <a:ext cx="8589600" cy="3232440"/>
           </a:xfrm>
           <a:prstGeom prst="rect">
             <a:avLst/>
@@ -5948,7 +5724,7 @@
         <p:spPr>
           <a:xfrm>
             <a:off x="216000" y="216000"/>
-            <a:ext cx="8855640" cy="363960"/>
+            <a:ext cx="8854920" cy="363960"/>
           </a:xfrm>
           <a:prstGeom prst="rect">
             <a:avLst/>
@@ -5976,7 +5752,11 @@
             </a:pPr>
             <a:r>
               <a:rPr b="0" lang="es-AR" sz="1800" spc="-1" strike="noStrike">
-                <a:latin typeface="Arial"/>
+                <a:solidFill>
+                  <a:srgbClr val="000000"/>
+                </a:solidFill>
+                <a:latin typeface="Arial"/>
+                <a:ea typeface="DejaVu Sans"/>
               </a:rPr>
               <a:t>INGENIERÍA DE SOFTWARE II – Ing. En Sistemas de Información</a:t>
             </a:r>
@@ -5999,7 +5779,7 @@
         <p:spPr>
           <a:xfrm>
             <a:off x="9000000" y="144000"/>
-            <a:ext cx="722520" cy="722520"/>
+            <a:ext cx="721800" cy="721800"/>
           </a:xfrm>
           <a:prstGeom prst="rect">
             <a:avLst/>
@@ -6018,7 +5798,7 @@
         <p:spPr>
           <a:xfrm>
             <a:off x="360000" y="720000"/>
-            <a:ext cx="6191640" cy="364680"/>
+            <a:ext cx="6190920" cy="363960"/>
           </a:xfrm>
           <a:prstGeom prst="rect">
             <a:avLst/>
@@ -6046,7 +5826,11 @@
             </a:pPr>
             <a:r>
               <a:rPr b="1" lang="es-AR" sz="1800" spc="-1" strike="noStrike">
-                <a:latin typeface="Arial"/>
+                <a:solidFill>
+                  <a:srgbClr val="000000"/>
+                </a:solidFill>
+                <a:latin typeface="Arial"/>
+                <a:ea typeface="DejaVu Sans"/>
               </a:rPr>
               <a:t>Sin Factory            :-(</a:t>
             </a:r>
@@ -6065,7 +5849,7 @@
         <p:spPr>
           <a:xfrm>
             <a:off x="504000" y="1368000"/>
-            <a:ext cx="9215640" cy="3557520"/>
+            <a:ext cx="9214920" cy="3557520"/>
           </a:xfrm>
           <a:prstGeom prst="rect">
             <a:avLst/>
@@ -6093,7 +5877,11 @@
             </a:pPr>
             <a:r>
               <a:rPr b="0" lang="es-AR" sz="1200" spc="-1" strike="noStrike">
-                <a:latin typeface="Arial"/>
+                <a:solidFill>
+                  <a:srgbClr val="000000"/>
+                </a:solidFill>
+                <a:latin typeface="Arial"/>
+                <a:ea typeface="DejaVu Sans"/>
               </a:rPr>
               <a:t>Int ladoA = 1;</a:t>
             </a:r>
@@ -6119,7 +5907,11 @@
             </a:pPr>
             <a:r>
               <a:rPr b="0" lang="es-AR" sz="1200" spc="-1" strike="noStrike">
-                <a:latin typeface="Arial"/>
+                <a:solidFill>
+                  <a:srgbClr val="000000"/>
+                </a:solidFill>
+                <a:latin typeface="Arial"/>
+                <a:ea typeface="DejaVu Sans"/>
               </a:rPr>
               <a:t>Int ladoB = 1;</a:t>
             </a:r>
@@ -6145,7 +5937,11 @@
             </a:pPr>
             <a:r>
               <a:rPr b="0" lang="es-AR" sz="1200" spc="-1" strike="noStrike">
-                <a:latin typeface="Arial"/>
+                <a:solidFill>
+                  <a:srgbClr val="000000"/>
+                </a:solidFill>
+                <a:latin typeface="Arial"/>
+                <a:ea typeface="DejaVu Sans"/>
               </a:rPr>
               <a:t>Int ladoC = 1;</a:t>
             </a:r>
@@ -6171,7 +5967,11 @@
             </a:pPr>
             <a:r>
               <a:rPr b="0" lang="es-AR" sz="1200" spc="-1" strike="noStrike">
-                <a:latin typeface="Arial"/>
+                <a:solidFill>
+                  <a:srgbClr val="000000"/>
+                </a:solidFill>
+                <a:latin typeface="Arial"/>
+                <a:ea typeface="DejaVu Sans"/>
               </a:rPr>
               <a:t>public static void main(String[] args) {</a:t>
             </a:r>
@@ -6187,7 +5987,11 @@
             </a:pPr>
             <a:r>
               <a:rPr b="0" lang="es-AR" sz="1200" spc="-1" strike="noStrike">
-                <a:latin typeface="Arial"/>
+                <a:solidFill>
+                  <a:srgbClr val="000000"/>
+                </a:solidFill>
+                <a:latin typeface="Arial"/>
+                <a:ea typeface="DejaVu Sans"/>
               </a:rPr>
               <a:t>	</a:t>
             </a:r>
@@ -6203,13 +6007,21 @@
             </a:pPr>
             <a:r>
               <a:rPr b="0" lang="es-AR" sz="1200" spc="-1" strike="noStrike">
-                <a:latin typeface="Arial"/>
+                <a:solidFill>
+                  <a:srgbClr val="000000"/>
+                </a:solidFill>
+                <a:latin typeface="Arial"/>
+                <a:ea typeface="DejaVu Sans"/>
               </a:rPr>
               <a:t>	</a:t>
             </a:r>
             <a:r>
               <a:rPr b="0" lang="es-AR" sz="1200" spc="-1" strike="noStrike">
-                <a:latin typeface="Arial"/>
+                <a:solidFill>
+                  <a:srgbClr val="000000"/>
+                </a:solidFill>
+                <a:latin typeface="Arial"/>
+                <a:ea typeface="DejaVu Sans"/>
               </a:rPr>
               <a:t>Triangulo triangulo;</a:t>
             </a:r>
@@ -6235,13 +6047,21 @@
             </a:pPr>
             <a:r>
               <a:rPr b="0" lang="es-AR" sz="1200" spc="-1" strike="noStrike">
-                <a:latin typeface="Arial"/>
+                <a:solidFill>
+                  <a:srgbClr val="000000"/>
+                </a:solidFill>
+                <a:latin typeface="Arial"/>
+                <a:ea typeface="DejaVu Sans"/>
               </a:rPr>
               <a:t>	</a:t>
             </a:r>
             <a:r>
               <a:rPr b="0" lang="es-AR" sz="1200" spc="-1" strike="noStrike">
-                <a:latin typeface="Arial"/>
+                <a:solidFill>
+                  <a:srgbClr val="000000"/>
+                </a:solidFill>
+                <a:latin typeface="Arial"/>
+                <a:ea typeface="DejaVu Sans"/>
               </a:rPr>
               <a:t>if(ladoA == ladoB &amp;&amp; ladoA != ladoC){</a:t>
             </a:r>
@@ -6257,37 +6077,61 @@
             </a:pPr>
             <a:r>
               <a:rPr b="0" lang="es-AR" sz="1200" spc="-1" strike="noStrike">
-                <a:latin typeface="Arial"/>
+                <a:solidFill>
+                  <a:srgbClr val="000000"/>
+                </a:solidFill>
+                <a:latin typeface="Arial"/>
+                <a:ea typeface="DejaVu Sans"/>
               </a:rPr>
               <a:t>	</a:t>
             </a:r>
             <a:r>
               <a:rPr b="0" lang="es-AR" sz="1200" spc="-1" strike="noStrike">
-                <a:latin typeface="Arial"/>
+                <a:solidFill>
+                  <a:srgbClr val="000000"/>
+                </a:solidFill>
+                <a:latin typeface="Arial"/>
+                <a:ea typeface="DejaVu Sans"/>
               </a:rPr>
               <a:t>	</a:t>
             </a:r>
             <a:r>
               <a:rPr b="0" lang="es-AR" sz="1200" spc="-1" strike="noStrike">
-                <a:latin typeface="Arial"/>
+                <a:solidFill>
+                  <a:srgbClr val="000000"/>
+                </a:solidFill>
+                <a:latin typeface="Arial"/>
+                <a:ea typeface="DejaVu Sans"/>
               </a:rPr>
               <a:t>	</a:t>
             </a:r>
             <a:r>
               <a:rPr b="0" lang="es-AR" sz="1200" spc="-1" strike="noStrike">
-                <a:latin typeface="Arial"/>
+                <a:solidFill>
+                  <a:srgbClr val="000000"/>
+                </a:solidFill>
+                <a:latin typeface="Arial"/>
+                <a:ea typeface="DejaVu Sans"/>
               </a:rPr>
               <a:t>triangulo = new TrianguloIsosceles(ladoA, ladoB, ladoC);</a:t>
             </a:r>
             <a:r>
               <a:rPr b="0" lang="es-AR" sz="1200" spc="-1" strike="noStrike">
-                <a:latin typeface="Arial"/>
+                <a:solidFill>
+                  <a:srgbClr val="000000"/>
+                </a:solidFill>
+                <a:latin typeface="Arial"/>
+                <a:ea typeface="DejaVu Sans"/>
               </a:rPr>
               <a:t>	</a:t>
             </a:r>
             <a:r>
               <a:rPr b="0" lang="es-AR" sz="1200" spc="-1" strike="noStrike">
-                <a:latin typeface="Arial"/>
+                <a:solidFill>
+                  <a:srgbClr val="000000"/>
+                </a:solidFill>
+                <a:latin typeface="Arial"/>
+                <a:ea typeface="DejaVu Sans"/>
               </a:rPr>
               <a:t>	</a:t>
             </a:r>
@@ -6303,13 +6147,21 @@
             </a:pPr>
             <a:r>
               <a:rPr b="0" lang="es-AR" sz="1200" spc="-1" strike="noStrike">
-                <a:latin typeface="Arial"/>
+                <a:solidFill>
+                  <a:srgbClr val="000000"/>
+                </a:solidFill>
+                <a:latin typeface="Arial"/>
+                <a:ea typeface="DejaVu Sans"/>
               </a:rPr>
               <a:t>	</a:t>
             </a:r>
             <a:r>
               <a:rPr b="0" lang="es-AR" sz="1200" spc="-1" strike="noStrike">
-                <a:latin typeface="Arial"/>
+                <a:solidFill>
+                  <a:srgbClr val="000000"/>
+                </a:solidFill>
+                <a:latin typeface="Arial"/>
+                <a:ea typeface="DejaVu Sans"/>
               </a:rPr>
               <a:t>} ese if(ladoA == ladoB == ladoC){</a:t>
             </a:r>
@@ -6325,25 +6177,41 @@
             </a:pPr>
             <a:r>
               <a:rPr b="0" lang="es-AR" sz="1200" spc="-1" strike="noStrike">
-                <a:latin typeface="Arial"/>
+                <a:solidFill>
+                  <a:srgbClr val="000000"/>
+                </a:solidFill>
+                <a:latin typeface="Arial"/>
+                <a:ea typeface="DejaVu Sans"/>
               </a:rPr>
               <a:t>	</a:t>
             </a:r>
             <a:r>
               <a:rPr b="0" lang="es-AR" sz="1200" spc="-1" strike="noStrike">
-                <a:latin typeface="Arial"/>
+                <a:solidFill>
+                  <a:srgbClr val="000000"/>
+                </a:solidFill>
+                <a:latin typeface="Arial"/>
+                <a:ea typeface="DejaVu Sans"/>
               </a:rPr>
               <a:t>	</a:t>
             </a:r>
             <a:r>
               <a:rPr b="0" lang="es-AR" sz="1200" spc="-1" strike="noStrike">
-                <a:latin typeface="Arial"/>
+                <a:solidFill>
+                  <a:srgbClr val="000000"/>
+                </a:solidFill>
+                <a:latin typeface="Arial"/>
+                <a:ea typeface="DejaVu Sans"/>
               </a:rPr>
               <a:t>	</a:t>
             </a:r>
             <a:r>
               <a:rPr b="0" lang="es-AR" sz="1200" spc="-1" strike="noStrike">
-                <a:latin typeface="Arial"/>
+                <a:solidFill>
+                  <a:srgbClr val="000000"/>
+                </a:solidFill>
+                <a:latin typeface="Arial"/>
+                <a:ea typeface="DejaVu Sans"/>
               </a:rPr>
               <a:t>triangulo = new TrianguloEquilatero(ladoA, ladoB, ladoC);</a:t>
             </a:r>
@@ -6359,19 +6227,31 @@
             </a:pPr>
             <a:r>
               <a:rPr b="0" lang="es-AR" sz="1200" spc="-1" strike="noStrike">
-                <a:latin typeface="Arial"/>
+                <a:solidFill>
+                  <a:srgbClr val="000000"/>
+                </a:solidFill>
+                <a:latin typeface="Arial"/>
+                <a:ea typeface="DejaVu Sans"/>
               </a:rPr>
               <a:t>	</a:t>
             </a:r>
             <a:r>
               <a:rPr b="0" lang="es-AR" sz="1200" spc="-1" strike="noStrike">
-                <a:latin typeface="Arial"/>
+                <a:solidFill>
+                  <a:srgbClr val="000000"/>
+                </a:solidFill>
+                <a:latin typeface="Arial"/>
+                <a:ea typeface="DejaVu Sans"/>
               </a:rPr>
               <a:t>	</a:t>
             </a:r>
             <a:r>
               <a:rPr b="0" lang="es-AR" sz="1200" spc="-1" strike="noStrike">
-                <a:latin typeface="Arial"/>
+                <a:solidFill>
+                  <a:srgbClr val="000000"/>
+                </a:solidFill>
+                <a:latin typeface="Arial"/>
+                <a:ea typeface="DejaVu Sans"/>
               </a:rPr>
               <a:t>}else{</a:t>
             </a:r>
@@ -6387,25 +6267,41 @@
             </a:pPr>
             <a:r>
               <a:rPr b="0" lang="es-AR" sz="1200" spc="-1" strike="noStrike">
-                <a:latin typeface="Arial"/>
+                <a:solidFill>
+                  <a:srgbClr val="000000"/>
+                </a:solidFill>
+                <a:latin typeface="Arial"/>
+                <a:ea typeface="DejaVu Sans"/>
               </a:rPr>
               <a:t>	</a:t>
             </a:r>
             <a:r>
               <a:rPr b="0" lang="es-AR" sz="1200" spc="-1" strike="noStrike">
-                <a:latin typeface="Arial"/>
+                <a:solidFill>
+                  <a:srgbClr val="000000"/>
+                </a:solidFill>
+                <a:latin typeface="Arial"/>
+                <a:ea typeface="DejaVu Sans"/>
               </a:rPr>
               <a:t>	</a:t>
             </a:r>
             <a:r>
               <a:rPr b="0" lang="es-AR" sz="1200" spc="-1" strike="noStrike">
-                <a:latin typeface="Arial"/>
+                <a:solidFill>
+                  <a:srgbClr val="000000"/>
+                </a:solidFill>
+                <a:latin typeface="Arial"/>
+                <a:ea typeface="DejaVu Sans"/>
               </a:rPr>
               <a:t>	</a:t>
             </a:r>
             <a:r>
               <a:rPr b="0" lang="es-AR" sz="1200" spc="-1" strike="noStrike">
-                <a:latin typeface="Arial"/>
+                <a:solidFill>
+                  <a:srgbClr val="000000"/>
+                </a:solidFill>
+                <a:latin typeface="Arial"/>
+                <a:ea typeface="DejaVu Sans"/>
               </a:rPr>
               <a:t>triangulo = new TrianguloEscaleno(ladoA, ladoB, ladoC);</a:t>
             </a:r>
@@ -6421,19 +6317,31 @@
             </a:pPr>
             <a:r>
               <a:rPr b="0" lang="es-AR" sz="1200" spc="-1" strike="noStrike">
-                <a:latin typeface="Arial"/>
+                <a:solidFill>
+                  <a:srgbClr val="000000"/>
+                </a:solidFill>
+                <a:latin typeface="Arial"/>
+                <a:ea typeface="DejaVu Sans"/>
               </a:rPr>
               <a:t>	</a:t>
             </a:r>
             <a:r>
               <a:rPr b="0" lang="es-AR" sz="1200" spc="-1" strike="noStrike">
-                <a:latin typeface="Arial"/>
+                <a:solidFill>
+                  <a:srgbClr val="000000"/>
+                </a:solidFill>
+                <a:latin typeface="Arial"/>
+                <a:ea typeface="DejaVu Sans"/>
               </a:rPr>
               <a:t>	</a:t>
             </a:r>
             <a:r>
               <a:rPr b="0" lang="es-AR" sz="1200" spc="-1" strike="noStrike">
-                <a:latin typeface="Arial"/>
+                <a:solidFill>
+                  <a:srgbClr val="000000"/>
+                </a:solidFill>
+                <a:latin typeface="Arial"/>
+                <a:ea typeface="DejaVu Sans"/>
               </a:rPr>
               <a:t>}</a:t>
             </a:r>
@@ -6459,7 +6367,11 @@
             </a:pPr>
             <a:r>
               <a:rPr b="0" lang="es-AR" sz="1200" spc="-1" strike="noStrike">
-                <a:latin typeface="Arial"/>
+                <a:solidFill>
+                  <a:srgbClr val="000000"/>
+                </a:solidFill>
+                <a:latin typeface="Arial"/>
+                <a:ea typeface="DejaVu Sans"/>
               </a:rPr>
               <a:t>}</a:t>
             </a:r>
@@ -6469,6 +6381,29 @@
           </a:p>
         </p:txBody>
       </p:sp>
+      <p:pic>
+        <p:nvPicPr>
+          <p:cNvPr id="72" name="" descr=""/>
+          <p:cNvPicPr/>
+          <p:nvPr/>
+        </p:nvPicPr>
+        <p:blipFill>
+          <a:blip r:embed="rId2"/>
+          <a:stretch/>
+        </p:blipFill>
+        <p:spPr>
+          <a:xfrm>
+            <a:off x="6480000" y="2160000"/>
+            <a:ext cx="3071520" cy="2303640"/>
+          </a:xfrm>
+          <a:prstGeom prst="rect">
+            <a:avLst/>
+          </a:prstGeom>
+          <a:ln>
+            <a:noFill/>
+          </a:ln>
+        </p:spPr>
+      </p:pic>
     </p:spTree>
   </p:cSld>
   <mc:AlternateContent>
@@ -6528,14 +6463,14 @@
       </p:grpSpPr>
       <p:sp>
         <p:nvSpPr>
-          <p:cNvPr id="72" name="CustomShape 1"/>
+          <p:cNvPr id="73" name="CustomShape 1"/>
           <p:cNvSpPr/>
           <p:nvPr/>
         </p:nvSpPr>
         <p:spPr>
           <a:xfrm>
             <a:off x="216000" y="216000"/>
-            <a:ext cx="8855640" cy="363960"/>
+            <a:ext cx="8854920" cy="363960"/>
           </a:xfrm>
           <a:prstGeom prst="rect">
             <a:avLst/>
@@ -6563,7 +6498,11 @@
             </a:pPr>
             <a:r>
               <a:rPr b="0" lang="es-AR" sz="1800" spc="-1" strike="noStrike">
-                <a:latin typeface="Arial"/>
+                <a:solidFill>
+                  <a:srgbClr val="000000"/>
+                </a:solidFill>
+                <a:latin typeface="Arial"/>
+                <a:ea typeface="DejaVu Sans"/>
               </a:rPr>
               <a:t>INGENIERÍA DE SOFTWARE II – Ing. En Sistemas de Información</a:t>
             </a:r>
@@ -6575,7 +6514,7 @@
       </p:sp>
       <p:pic>
         <p:nvPicPr>
-          <p:cNvPr id="73" name="" descr=""/>
+          <p:cNvPr id="74" name="" descr=""/>
           <p:cNvPicPr/>
           <p:nvPr/>
         </p:nvPicPr>
@@ -6586,7 +6525,7 @@
         <p:spPr>
           <a:xfrm>
             <a:off x="9000000" y="144000"/>
-            <a:ext cx="722520" cy="722520"/>
+            <a:ext cx="721800" cy="721800"/>
           </a:xfrm>
           <a:prstGeom prst="rect">
             <a:avLst/>
@@ -6598,14 +6537,14 @@
       </p:pic>
       <p:sp>
         <p:nvSpPr>
-          <p:cNvPr id="74" name="CustomShape 2"/>
+          <p:cNvPr id="75" name="CustomShape 2"/>
           <p:cNvSpPr/>
           <p:nvPr/>
         </p:nvSpPr>
         <p:spPr>
           <a:xfrm>
             <a:off x="360000" y="720000"/>
-            <a:ext cx="6191640" cy="364680"/>
+            <a:ext cx="6190920" cy="363960"/>
           </a:xfrm>
           <a:prstGeom prst="rect">
             <a:avLst/>
@@ -6633,7 +6572,11 @@
             </a:pPr>
             <a:r>
               <a:rPr b="1" lang="es-AR" sz="1800" spc="-1" strike="noStrike">
-                <a:latin typeface="Arial"/>
+                <a:solidFill>
+                  <a:srgbClr val="000000"/>
+                </a:solidFill>
+                <a:latin typeface="Arial"/>
+                <a:ea typeface="DejaVu Sans"/>
               </a:rPr>
               <a:t>Con Factory            :-)</a:t>
             </a:r>
@@ -6645,7 +6588,7 @@
       </p:sp>
       <p:pic>
         <p:nvPicPr>
-          <p:cNvPr id="75" name="" descr=""/>
+          <p:cNvPr id="76" name="" descr=""/>
           <p:cNvPicPr/>
           <p:nvPr/>
         </p:nvPicPr>
@@ -6656,7 +6599,7 @@
         <p:spPr>
           <a:xfrm>
             <a:off x="1500840" y="1152000"/>
-            <a:ext cx="7642800" cy="4289400"/>
+            <a:ext cx="7642080" cy="4288680"/>
           </a:xfrm>
           <a:prstGeom prst="rect">
             <a:avLst/>
@@ -6725,14 +6668,14 @@
       </p:grpSpPr>
       <p:sp>
         <p:nvSpPr>
-          <p:cNvPr id="76" name="CustomShape 1"/>
+          <p:cNvPr id="77" name="CustomShape 1"/>
           <p:cNvSpPr/>
           <p:nvPr/>
         </p:nvSpPr>
         <p:spPr>
           <a:xfrm>
             <a:off x="216000" y="216000"/>
-            <a:ext cx="8855640" cy="363960"/>
+            <a:ext cx="8854920" cy="363960"/>
           </a:xfrm>
           <a:prstGeom prst="rect">
             <a:avLst/>
@@ -6760,7 +6703,11 @@
             </a:pPr>
             <a:r>
               <a:rPr b="0" lang="es-AR" sz="1800" spc="-1" strike="noStrike">
-                <a:latin typeface="Arial"/>
+                <a:solidFill>
+                  <a:srgbClr val="000000"/>
+                </a:solidFill>
+                <a:latin typeface="Arial"/>
+                <a:ea typeface="DejaVu Sans"/>
               </a:rPr>
               <a:t>INGENIERÍA DE SOFTWARE II – Ing. En Sistemas de Información</a:t>
             </a:r>
@@ -6772,7 +6719,7 @@
       </p:sp>
       <p:pic>
         <p:nvPicPr>
-          <p:cNvPr id="77" name="" descr=""/>
+          <p:cNvPr id="78" name="" descr=""/>
           <p:cNvPicPr/>
           <p:nvPr/>
         </p:nvPicPr>
@@ -6783,7 +6730,7 @@
         <p:spPr>
           <a:xfrm>
             <a:off x="9000000" y="144000"/>
-            <a:ext cx="722520" cy="722520"/>
+            <a:ext cx="721800" cy="721800"/>
           </a:xfrm>
           <a:prstGeom prst="rect">
             <a:avLst/>
@@ -6795,14 +6742,14 @@
       </p:pic>
       <p:sp>
         <p:nvSpPr>
-          <p:cNvPr id="78" name="CustomShape 2"/>
+          <p:cNvPr id="79" name="CustomShape 2"/>
           <p:cNvSpPr/>
           <p:nvPr/>
         </p:nvSpPr>
         <p:spPr>
           <a:xfrm>
             <a:off x="360000" y="720000"/>
-            <a:ext cx="6191640" cy="364680"/>
+            <a:ext cx="6190920" cy="363960"/>
           </a:xfrm>
           <a:prstGeom prst="rect">
             <a:avLst/>
@@ -6830,7 +6777,11 @@
             </a:pPr>
             <a:r>
               <a:rPr b="1" lang="es-AR" sz="1800" spc="-1" strike="noStrike">
-                <a:latin typeface="Arial"/>
+                <a:solidFill>
+                  <a:srgbClr val="000000"/>
+                </a:solidFill>
+                <a:latin typeface="Arial"/>
+                <a:ea typeface="DejaVu Sans"/>
               </a:rPr>
               <a:t>Con Factory            :-)</a:t>
             </a:r>
@@ -6842,14 +6793,14 @@
       </p:sp>
       <p:sp>
         <p:nvSpPr>
-          <p:cNvPr id="79" name="CustomShape 3"/>
+          <p:cNvPr id="80" name="CustomShape 3"/>
           <p:cNvSpPr/>
           <p:nvPr/>
         </p:nvSpPr>
         <p:spPr>
           <a:xfrm>
             <a:off x="792000" y="1512000"/>
-            <a:ext cx="8351640" cy="1461240"/>
+            <a:ext cx="8350920" cy="1461240"/>
           </a:xfrm>
           <a:prstGeom prst="rect">
             <a:avLst/>
@@ -6877,7 +6828,11 @@
             </a:pPr>
             <a:r>
               <a:rPr b="0" lang="es-AR" sz="1800" spc="-1" strike="noStrike">
-                <a:latin typeface="Arial"/>
+                <a:solidFill>
+                  <a:srgbClr val="000000"/>
+                </a:solidFill>
+                <a:latin typeface="Arial"/>
+                <a:ea typeface="DejaVu Sans"/>
               </a:rPr>
               <a:t>TrianguloFactory trianguloFactory = new TrianguloFactory();</a:t>
             </a:r>
@@ -6903,7 +6858,11 @@
             </a:pPr>
             <a:r>
               <a:rPr b="0" lang="es-AR" sz="1800" spc="-1" strike="noStrike">
-                <a:latin typeface="Arial"/>
+                <a:solidFill>
+                  <a:srgbClr val="000000"/>
+                </a:solidFill>
+                <a:latin typeface="Arial"/>
+                <a:ea typeface="DejaVu Sans"/>
               </a:rPr>
               <a:t>Triangulo triangulo = trianguloFactory(5,5,5);</a:t>
             </a:r>
@@ -6929,7 +6888,11 @@
             </a:pPr>
             <a:r>
               <a:rPr b="0" lang="es-AR" sz="1800" spc="-1" strike="noStrike">
-                <a:latin typeface="Arial"/>
+                <a:solidFill>
+                  <a:srgbClr val="000000"/>
+                </a:solidFill>
+                <a:latin typeface="Arial"/>
+                <a:ea typeface="DejaVu Sans"/>
               </a:rPr>
               <a:t>System.out.println(triangulo.getDescripcion());</a:t>
             </a:r>
@@ -6941,7 +6904,7 @@
       </p:sp>
       <p:pic>
         <p:nvPicPr>
-          <p:cNvPr id="80" name="" descr=""/>
+          <p:cNvPr id="81" name="" descr=""/>
           <p:cNvPicPr/>
           <p:nvPr/>
         </p:nvPicPr>
@@ -6952,7 +6915,7 @@
         <p:spPr>
           <a:xfrm>
             <a:off x="936000" y="3391200"/>
-            <a:ext cx="7487640" cy="1288440"/>
+            <a:ext cx="7486920" cy="1287720"/>
           </a:xfrm>
           <a:prstGeom prst="rect">
             <a:avLst/>

</xml_diff>

<commit_message>
refs se actualiza ppt
</commit_message>
<xml_diff>
--- a/Documentación/Factory Pattern.pptx
+++ b/Documentación/Factory Pattern.pptx
@@ -1456,7 +1456,7 @@
         </p:spPr>
         <p:txBody>
           <a:bodyPr lIns="0" rIns="0" tIns="0" bIns="0">
-            <a:normAutofit/>
+            <a:normAutofit fontScale="94000"/>
           </a:bodyPr>
           <a:p>
             <a:pPr marL="432000" indent="-324000">
@@ -1660,7 +1660,7 @@
         <p:spPr>
           <a:xfrm>
             <a:off x="216000" y="216000"/>
-            <a:ext cx="8854920" cy="363960"/>
+            <a:ext cx="8854560" cy="363960"/>
           </a:xfrm>
           <a:prstGeom prst="rect">
             <a:avLst/>
@@ -1715,7 +1715,7 @@
         <p:spPr>
           <a:xfrm>
             <a:off x="9000000" y="144000"/>
-            <a:ext cx="721800" cy="721800"/>
+            <a:ext cx="721440" cy="721440"/>
           </a:xfrm>
           <a:prstGeom prst="rect">
             <a:avLst/>
@@ -1734,7 +1734,7 @@
         <p:spPr>
           <a:xfrm>
             <a:off x="360000" y="1080000"/>
-            <a:ext cx="9214920" cy="2466720"/>
+            <a:ext cx="9214560" cy="2710080"/>
           </a:xfrm>
           <a:prstGeom prst="rect">
             <a:avLst/>
@@ -1912,7 +1912,7 @@
         <p:spPr>
           <a:xfrm>
             <a:off x="216000" y="216000"/>
-            <a:ext cx="8854920" cy="363960"/>
+            <a:ext cx="8854560" cy="363960"/>
           </a:xfrm>
           <a:prstGeom prst="rect">
             <a:avLst/>
@@ -1967,7 +1967,7 @@
         <p:spPr>
           <a:xfrm>
             <a:off x="9000000" y="144000"/>
-            <a:ext cx="721800" cy="721800"/>
+            <a:ext cx="721440" cy="721440"/>
           </a:xfrm>
           <a:prstGeom prst="rect">
             <a:avLst/>
@@ -1986,7 +1986,7 @@
         <p:spPr>
           <a:xfrm>
             <a:off x="360000" y="1080000"/>
-            <a:ext cx="5760000" cy="364680"/>
+            <a:ext cx="5759640" cy="364320"/>
           </a:xfrm>
           <a:prstGeom prst="rect">
             <a:avLst/>
@@ -2022,7 +2022,7 @@
               </a:rPr>
               <a:t>EJEMPLO CÁLCULO IVA – JAVA Y TYPESCRIPT</a:t>
             </a:r>
-            <a:endParaRPr b="1" lang="es-AR" sz="1800" spc="-1" strike="noStrike">
+            <a:endParaRPr b="0" lang="es-AR" sz="1800" spc="-1" strike="noStrike">
               <a:latin typeface="Arial"/>
             </a:endParaRPr>
           </a:p>
@@ -2041,7 +2041,7 @@
         <p:spPr>
           <a:xfrm>
             <a:off x="413640" y="1752840"/>
-            <a:ext cx="1674360" cy="1253880"/>
+            <a:ext cx="1674000" cy="1253520"/>
           </a:xfrm>
           <a:prstGeom prst="rect">
             <a:avLst/>
@@ -2060,7 +2060,7 @@
         <p:spPr>
           <a:xfrm>
             <a:off x="2880000" y="1551240"/>
-            <a:ext cx="6695280" cy="1794600"/>
+            <a:ext cx="6694920" cy="1794600"/>
           </a:xfrm>
           <a:prstGeom prst="rect">
             <a:avLst/>
@@ -2170,7 +2170,7 @@
         </p:nvGraphicFramePr>
         <p:xfrm>
           <a:off x="2972880" y="3373200"/>
-          <a:ext cx="6170760" cy="1810080"/>
+          <a:ext cx="6170760" cy="1809720"/>
         </p:xfrm>
         <a:graphic>
           <a:graphicData uri="http://schemas.openxmlformats.org/drawingml/2006/table">
@@ -2562,7 +2562,7 @@
                   </a:tcPr>
                 </a:tc>
               </a:tr>
-              <a:tr h="299160">
+              <a:tr h="298800">
                 <a:tc>
                   <a:txBody>
                     <a:bodyPr lIns="90000" rIns="90000">
@@ -2719,7 +2719,7 @@
         <p:spPr>
           <a:xfrm>
             <a:off x="576000" y="3482640"/>
-            <a:ext cx="1583280" cy="1053360"/>
+            <a:ext cx="1582920" cy="1053000"/>
           </a:xfrm>
           <a:prstGeom prst="rect">
             <a:avLst/>
@@ -2795,7 +2795,7 @@
         <p:spPr>
           <a:xfrm>
             <a:off x="216000" y="216000"/>
-            <a:ext cx="8854920" cy="363960"/>
+            <a:ext cx="8854560" cy="363960"/>
           </a:xfrm>
           <a:prstGeom prst="rect">
             <a:avLst/>
@@ -2850,7 +2850,7 @@
         <p:spPr>
           <a:xfrm>
             <a:off x="9000000" y="144000"/>
-            <a:ext cx="721800" cy="721800"/>
+            <a:ext cx="721440" cy="721440"/>
           </a:xfrm>
           <a:prstGeom prst="rect">
             <a:avLst/>
@@ -2869,7 +2869,7 @@
         <p:spPr>
           <a:xfrm>
             <a:off x="360000" y="1080000"/>
-            <a:ext cx="5760000" cy="364680"/>
+            <a:ext cx="5759640" cy="364320"/>
           </a:xfrm>
           <a:prstGeom prst="rect">
             <a:avLst/>
@@ -2905,22 +2905,22 @@
               </a:rPr>
               <a:t>EJEMPLO CÁLCULO IVA – JAVA Y TYPESCRIPT</a:t>
             </a:r>
-            <a:endParaRPr b="1" lang="es-AR" sz="1800" spc="-1" strike="noStrike">
-              <a:latin typeface="Arial"/>
-            </a:endParaRPr>
-          </a:p>
-        </p:txBody>
-      </p:sp>
-      <p:sp>
-        <p:nvSpPr>
-          <p:cNvPr id="92" name="TextShape 3"/>
-          <p:cNvSpPr txBox="1"/>
+            <a:endParaRPr b="0" lang="es-AR" sz="1800" spc="-1" strike="noStrike">
+              <a:latin typeface="Arial"/>
+            </a:endParaRPr>
+          </a:p>
+        </p:txBody>
+      </p:sp>
+      <p:sp>
+        <p:nvSpPr>
+          <p:cNvPr id="92" name="CustomShape 3"/>
+          <p:cNvSpPr/>
           <p:nvPr/>
         </p:nvSpPr>
         <p:spPr>
           <a:xfrm>
             <a:off x="1251000" y="2701800"/>
-            <a:ext cx="7699320" cy="456120"/>
+            <a:ext cx="7698960" cy="455760"/>
           </a:xfrm>
           <a:prstGeom prst="rect">
             <a:avLst/>
@@ -2930,20 +2930,35 @@
             <a:noFill/>
           </a:ln>
         </p:spPr>
+        <p:style>
+          <a:lnRef idx="0"/>
+          <a:fillRef idx="0"/>
+          <a:effectRef idx="0"/>
+          <a:fontRef idx="minor"/>
+        </p:style>
         <p:txBody>
           <a:bodyPr lIns="90000" rIns="90000" tIns="45000" bIns="45000">
             <a:spAutoFit/>
           </a:bodyPr>
           <a:p>
-            <a:r>
-              <a:rPr b="0" lang="es-AR" sz="2400" spc="-1" strike="noStrike">
+            <a:pPr>
+              <a:lnSpc>
+                <a:spcPct val="100000"/>
+              </a:lnSpc>
+            </a:pPr>
+            <a:r>
+              <a:rPr b="0" lang="es-AR" sz="2400" spc="-1" strike="noStrike" u="sng">
+                <a:solidFill>
+                  <a:srgbClr val="0000ff"/>
+                </a:solidFill>
+                <a:uFillTx/>
                 <a:latin typeface="Times New Roman"/>
                 <a:hlinkClick r:id="rId2"/>
               </a:rPr>
               <a:t>Diagrama de Clases del Ejemplo</a:t>
             </a:r>
             <a:endParaRPr b="0" lang="es-AR" sz="2400" spc="-1" strike="noStrike">
-              <a:latin typeface="Times New Roman"/>
+              <a:latin typeface="Arial"/>
             </a:endParaRPr>
           </a:p>
         </p:txBody>
@@ -3014,7 +3029,7 @@
         <p:spPr>
           <a:xfrm>
             <a:off x="216000" y="216000"/>
-            <a:ext cx="8854920" cy="363960"/>
+            <a:ext cx="8854560" cy="363960"/>
           </a:xfrm>
           <a:prstGeom prst="rect">
             <a:avLst/>
@@ -3069,7 +3084,7 @@
         <p:spPr>
           <a:xfrm>
             <a:off x="9000000" y="144000"/>
-            <a:ext cx="721800" cy="721800"/>
+            <a:ext cx="721440" cy="721440"/>
           </a:xfrm>
           <a:prstGeom prst="rect">
             <a:avLst/>
@@ -3088,7 +3103,7 @@
         <p:spPr>
           <a:xfrm>
             <a:off x="360000" y="1080000"/>
-            <a:ext cx="9286920" cy="2832840"/>
+            <a:ext cx="9286560" cy="2832840"/>
           </a:xfrm>
           <a:prstGeom prst="rect">
             <a:avLst/>
@@ -3346,7 +3361,7 @@
         <p:spPr>
           <a:xfrm>
             <a:off x="216000" y="216000"/>
-            <a:ext cx="8854920" cy="363960"/>
+            <a:ext cx="8854560" cy="363960"/>
           </a:xfrm>
           <a:prstGeom prst="rect">
             <a:avLst/>
@@ -3401,7 +3416,7 @@
         <p:spPr>
           <a:xfrm>
             <a:off x="9000000" y="144000"/>
-            <a:ext cx="721800" cy="721800"/>
+            <a:ext cx="721440" cy="721440"/>
           </a:xfrm>
           <a:prstGeom prst="rect">
             <a:avLst/>
@@ -3420,7 +3435,7 @@
         <p:spPr>
           <a:xfrm>
             <a:off x="360000" y="1080000"/>
-            <a:ext cx="9286920" cy="3381480"/>
+            <a:ext cx="9286560" cy="3381480"/>
           </a:xfrm>
           <a:prstGeom prst="rect">
             <a:avLst/>
@@ -3628,7 +3643,7 @@
         <p:spPr>
           <a:xfrm>
             <a:off x="216000" y="216000"/>
-            <a:ext cx="8854920" cy="363960"/>
+            <a:ext cx="8854560" cy="363960"/>
           </a:xfrm>
           <a:prstGeom prst="rect">
             <a:avLst/>
@@ -3683,7 +3698,7 @@
         <p:spPr>
           <a:xfrm>
             <a:off x="9000000" y="144000"/>
-            <a:ext cx="721800" cy="721800"/>
+            <a:ext cx="721440" cy="721440"/>
           </a:xfrm>
           <a:prstGeom prst="rect">
             <a:avLst/>
@@ -3702,7 +3717,7 @@
         <p:spPr>
           <a:xfrm>
             <a:off x="360000" y="1080000"/>
-            <a:ext cx="9286920" cy="3257640"/>
+            <a:ext cx="9286560" cy="3257640"/>
           </a:xfrm>
           <a:prstGeom prst="rect">
             <a:avLst/>
@@ -3837,7 +3852,7 @@
         <p:spPr>
           <a:xfrm>
             <a:off x="5184000" y="1521720"/>
-            <a:ext cx="4210560" cy="3157920"/>
+            <a:ext cx="4210200" cy="3157560"/>
           </a:xfrm>
           <a:prstGeom prst="rect">
             <a:avLst/>
@@ -3849,14 +3864,14 @@
       </p:pic>
       <p:sp>
         <p:nvSpPr>
-          <p:cNvPr id="103" name="TextShape 3"/>
-          <p:cNvSpPr txBox="1"/>
+          <p:cNvPr id="103" name="CustomShape 3"/>
+          <p:cNvSpPr/>
           <p:nvPr/>
         </p:nvSpPr>
         <p:spPr>
           <a:xfrm>
             <a:off x="2016000" y="5015880"/>
-            <a:ext cx="6120000" cy="456120"/>
+            <a:ext cx="6119640" cy="455760"/>
           </a:xfrm>
           <a:prstGeom prst="rect">
             <a:avLst/>
@@ -3866,20 +3881,35 @@
             <a:noFill/>
           </a:ln>
         </p:spPr>
+        <p:style>
+          <a:lnRef idx="0"/>
+          <a:fillRef idx="0"/>
+          <a:effectRef idx="0"/>
+          <a:fontRef idx="minor"/>
+        </p:style>
         <p:txBody>
           <a:bodyPr lIns="90000" rIns="90000" tIns="45000" bIns="45000">
             <a:spAutoFit/>
           </a:bodyPr>
           <a:p>
-            <a:r>
-              <a:rPr b="0" lang="es-AR" sz="2400" spc="-1" strike="noStrike">
+            <a:pPr>
+              <a:lnSpc>
+                <a:spcPct val="100000"/>
+              </a:lnSpc>
+            </a:pPr>
+            <a:r>
+              <a:rPr b="0" lang="es-AR" sz="2400" spc="-1" strike="noStrike" u="sng">
+                <a:solidFill>
+                  <a:srgbClr val="0000ff"/>
+                </a:solidFill>
+                <a:uFillTx/>
                 <a:latin typeface="Times New Roman"/>
                 <a:hlinkClick r:id="rId3"/>
               </a:rPr>
               <a:t>https://github.com/fabiodmk/factorypatternjava</a:t>
             </a:r>
             <a:endParaRPr b="0" lang="es-AR" sz="2400" spc="-1" strike="noStrike">
-              <a:latin typeface="Times New Roman"/>
+              <a:latin typeface="Arial"/>
             </a:endParaRPr>
           </a:p>
         </p:txBody>
@@ -3950,7 +3980,7 @@
         <p:spPr>
           <a:xfrm>
             <a:off x="216000" y="216000"/>
-            <a:ext cx="8854920" cy="363960"/>
+            <a:ext cx="8854560" cy="363960"/>
           </a:xfrm>
           <a:prstGeom prst="rect">
             <a:avLst/>
@@ -4005,7 +4035,7 @@
         <p:spPr>
           <a:xfrm>
             <a:off x="9000000" y="144000"/>
-            <a:ext cx="721800" cy="721800"/>
+            <a:ext cx="721440" cy="721440"/>
           </a:xfrm>
           <a:prstGeom prst="rect">
             <a:avLst/>
@@ -4024,7 +4054,7 @@
         <p:spPr>
           <a:xfrm>
             <a:off x="360000" y="1080000"/>
-            <a:ext cx="9214920" cy="4446720"/>
+            <a:ext cx="9214560" cy="4446720"/>
           </a:xfrm>
           <a:prstGeom prst="rect">
             <a:avLst/>
@@ -4302,7 +4332,7 @@
         <p:spPr>
           <a:xfrm>
             <a:off x="216000" y="216000"/>
-            <a:ext cx="8854920" cy="363960"/>
+            <a:ext cx="8854560" cy="363960"/>
           </a:xfrm>
           <a:prstGeom prst="rect">
             <a:avLst/>
@@ -4357,7 +4387,7 @@
         <p:spPr>
           <a:xfrm>
             <a:off x="9000000" y="144000"/>
-            <a:ext cx="721800" cy="721800"/>
+            <a:ext cx="721440" cy="721440"/>
           </a:xfrm>
           <a:prstGeom prst="rect">
             <a:avLst/>
@@ -4376,7 +4406,7 @@
         <p:spPr>
           <a:xfrm>
             <a:off x="360000" y="720000"/>
-            <a:ext cx="6190920" cy="363960"/>
+            <a:ext cx="6190560" cy="363960"/>
           </a:xfrm>
           <a:prstGeom prst="rect">
             <a:avLst/>
@@ -4427,7 +4457,7 @@
         <p:spPr>
           <a:xfrm>
             <a:off x="504000" y="1322280"/>
-            <a:ext cx="9142920" cy="363960"/>
+            <a:ext cx="9142560" cy="363960"/>
           </a:xfrm>
           <a:prstGeom prst="rect">
             <a:avLst/>
@@ -4478,7 +4508,7 @@
         <p:spPr>
           <a:xfrm>
             <a:off x="1224000" y="2664000"/>
-            <a:ext cx="1006920" cy="862920"/>
+            <a:ext cx="1006560" cy="862560"/>
           </a:xfrm>
           <a:custGeom>
             <a:avLst/>
@@ -4527,7 +4557,7 @@
         <p:spPr>
           <a:xfrm>
             <a:off x="4032000" y="1944000"/>
-            <a:ext cx="2158920" cy="790920"/>
+            <a:ext cx="2158560" cy="790560"/>
           </a:xfrm>
           <a:custGeom>
             <a:avLst/>
@@ -4574,7 +4604,7 @@
         <p:spPr>
           <a:xfrm>
             <a:off x="4392000" y="3168000"/>
-            <a:ext cx="1366920" cy="1006920"/>
+            <a:ext cx="1366560" cy="1006560"/>
           </a:xfrm>
           <a:custGeom>
             <a:avLst/>
@@ -4702,7 +4732,7 @@
         <p:spPr>
           <a:xfrm>
             <a:off x="1008000" y="3816000"/>
-            <a:ext cx="1654920" cy="363960"/>
+            <a:ext cx="1654560" cy="363960"/>
           </a:xfrm>
           <a:prstGeom prst="rect">
             <a:avLst/>
@@ -4753,7 +4783,7 @@
         <p:spPr>
           <a:xfrm>
             <a:off x="6408000" y="2016000"/>
-            <a:ext cx="3238920" cy="3381480"/>
+            <a:ext cx="3238560" cy="3381480"/>
           </a:xfrm>
           <a:prstGeom prst="rect">
             <a:avLst/>
@@ -4991,7 +5021,7 @@
         <p:spPr>
           <a:xfrm>
             <a:off x="216000" y="216000"/>
-            <a:ext cx="8854920" cy="363960"/>
+            <a:ext cx="8854560" cy="363960"/>
           </a:xfrm>
           <a:prstGeom prst="rect">
             <a:avLst/>
@@ -5046,7 +5076,7 @@
         <p:spPr>
           <a:xfrm>
             <a:off x="9000000" y="144000"/>
-            <a:ext cx="721800" cy="721800"/>
+            <a:ext cx="721440" cy="721440"/>
           </a:xfrm>
           <a:prstGeom prst="rect">
             <a:avLst/>
@@ -5065,7 +5095,7 @@
         <p:spPr>
           <a:xfrm>
             <a:off x="360000" y="720000"/>
-            <a:ext cx="6190920" cy="363960"/>
+            <a:ext cx="6190560" cy="363960"/>
           </a:xfrm>
           <a:prstGeom prst="rect">
             <a:avLst/>
@@ -5120,7 +5150,7 @@
         <p:spPr>
           <a:xfrm>
             <a:off x="1872000" y="1296000"/>
-            <a:ext cx="5902920" cy="3805200"/>
+            <a:ext cx="5902560" cy="3804840"/>
           </a:xfrm>
           <a:prstGeom prst="rect">
             <a:avLst/>
@@ -5196,7 +5226,7 @@
         <p:spPr>
           <a:xfrm>
             <a:off x="216000" y="216000"/>
-            <a:ext cx="8854920" cy="363960"/>
+            <a:ext cx="8854560" cy="363960"/>
           </a:xfrm>
           <a:prstGeom prst="rect">
             <a:avLst/>
@@ -5251,7 +5281,7 @@
         <p:spPr>
           <a:xfrm>
             <a:off x="9000000" y="144000"/>
-            <a:ext cx="721800" cy="721800"/>
+            <a:ext cx="721440" cy="721440"/>
           </a:xfrm>
           <a:prstGeom prst="rect">
             <a:avLst/>
@@ -5270,7 +5300,7 @@
         <p:spPr>
           <a:xfrm>
             <a:off x="360000" y="720000"/>
-            <a:ext cx="6190920" cy="363960"/>
+            <a:ext cx="6190560" cy="363960"/>
           </a:xfrm>
           <a:prstGeom prst="rect">
             <a:avLst/>
@@ -5321,7 +5351,7 @@
         <p:spPr>
           <a:xfrm>
             <a:off x="504000" y="1322280"/>
-            <a:ext cx="9142920" cy="2284200"/>
+            <a:ext cx="9142560" cy="2284200"/>
           </a:xfrm>
           <a:prstGeom prst="rect">
             <a:avLst/>
@@ -5519,7 +5549,7 @@
         <p:spPr>
           <a:xfrm>
             <a:off x="216000" y="216000"/>
-            <a:ext cx="8854920" cy="363960"/>
+            <a:ext cx="8854560" cy="363960"/>
           </a:xfrm>
           <a:prstGeom prst="rect">
             <a:avLst/>
@@ -5574,7 +5604,7 @@
         <p:spPr>
           <a:xfrm>
             <a:off x="9000000" y="144000"/>
-            <a:ext cx="721800" cy="721800"/>
+            <a:ext cx="721440" cy="721440"/>
           </a:xfrm>
           <a:prstGeom prst="rect">
             <a:avLst/>
@@ -5593,7 +5623,7 @@
         <p:spPr>
           <a:xfrm>
             <a:off x="360000" y="720000"/>
-            <a:ext cx="6190920" cy="363960"/>
+            <a:ext cx="6190560" cy="363960"/>
           </a:xfrm>
           <a:prstGeom prst="rect">
             <a:avLst/>
@@ -5648,7 +5678,7 @@
         <p:spPr>
           <a:xfrm>
             <a:off x="697680" y="1584000"/>
-            <a:ext cx="8589600" cy="3232440"/>
+            <a:ext cx="8589240" cy="3232080"/>
           </a:xfrm>
           <a:prstGeom prst="rect">
             <a:avLst/>
@@ -5724,7 +5754,7 @@
         <p:spPr>
           <a:xfrm>
             <a:off x="216000" y="216000"/>
-            <a:ext cx="8854920" cy="363960"/>
+            <a:ext cx="8854560" cy="363960"/>
           </a:xfrm>
           <a:prstGeom prst="rect">
             <a:avLst/>
@@ -5779,7 +5809,7 @@
         <p:spPr>
           <a:xfrm>
             <a:off x="9000000" y="144000"/>
-            <a:ext cx="721800" cy="721800"/>
+            <a:ext cx="721440" cy="721440"/>
           </a:xfrm>
           <a:prstGeom prst="rect">
             <a:avLst/>
@@ -5798,7 +5828,7 @@
         <p:spPr>
           <a:xfrm>
             <a:off x="360000" y="720000"/>
-            <a:ext cx="6190920" cy="363960"/>
+            <a:ext cx="6190560" cy="363960"/>
           </a:xfrm>
           <a:prstGeom prst="rect">
             <a:avLst/>
@@ -5849,7 +5879,7 @@
         <p:spPr>
           <a:xfrm>
             <a:off x="504000" y="1368000"/>
-            <a:ext cx="9214920" cy="3557520"/>
+            <a:ext cx="9214560" cy="3557520"/>
           </a:xfrm>
           <a:prstGeom prst="rect">
             <a:avLst/>
@@ -6394,7 +6424,7 @@
         <p:spPr>
           <a:xfrm>
             <a:off x="6480000" y="2160000"/>
-            <a:ext cx="3071520" cy="2303640"/>
+            <a:ext cx="3071160" cy="2303280"/>
           </a:xfrm>
           <a:prstGeom prst="rect">
             <a:avLst/>
@@ -6470,7 +6500,7 @@
         <p:spPr>
           <a:xfrm>
             <a:off x="216000" y="216000"/>
-            <a:ext cx="8854920" cy="363960"/>
+            <a:ext cx="8854560" cy="363960"/>
           </a:xfrm>
           <a:prstGeom prst="rect">
             <a:avLst/>
@@ -6525,7 +6555,7 @@
         <p:spPr>
           <a:xfrm>
             <a:off x="9000000" y="144000"/>
-            <a:ext cx="721800" cy="721800"/>
+            <a:ext cx="721440" cy="721440"/>
           </a:xfrm>
           <a:prstGeom prst="rect">
             <a:avLst/>
@@ -6544,7 +6574,7 @@
         <p:spPr>
           <a:xfrm>
             <a:off x="360000" y="720000"/>
-            <a:ext cx="6190920" cy="363960"/>
+            <a:ext cx="6190560" cy="363960"/>
           </a:xfrm>
           <a:prstGeom prst="rect">
             <a:avLst/>
@@ -6599,7 +6629,7 @@
         <p:spPr>
           <a:xfrm>
             <a:off x="1500840" y="1152000"/>
-            <a:ext cx="7642080" cy="4288680"/>
+            <a:ext cx="7641720" cy="4288320"/>
           </a:xfrm>
           <a:prstGeom prst="rect">
             <a:avLst/>
@@ -6675,7 +6705,7 @@
         <p:spPr>
           <a:xfrm>
             <a:off x="216000" y="216000"/>
-            <a:ext cx="8854920" cy="363960"/>
+            <a:ext cx="8854560" cy="363960"/>
           </a:xfrm>
           <a:prstGeom prst="rect">
             <a:avLst/>
@@ -6730,7 +6760,7 @@
         <p:spPr>
           <a:xfrm>
             <a:off x="9000000" y="144000"/>
-            <a:ext cx="721800" cy="721800"/>
+            <a:ext cx="721440" cy="721440"/>
           </a:xfrm>
           <a:prstGeom prst="rect">
             <a:avLst/>
@@ -6749,7 +6779,7 @@
         <p:spPr>
           <a:xfrm>
             <a:off x="360000" y="720000"/>
-            <a:ext cx="6190920" cy="363960"/>
+            <a:ext cx="6190560" cy="363960"/>
           </a:xfrm>
           <a:prstGeom prst="rect">
             <a:avLst/>
@@ -6800,7 +6830,7 @@
         <p:spPr>
           <a:xfrm>
             <a:off x="792000" y="1512000"/>
-            <a:ext cx="8350920" cy="1461240"/>
+            <a:ext cx="8350560" cy="1461240"/>
           </a:xfrm>
           <a:prstGeom prst="rect">
             <a:avLst/>
@@ -6915,7 +6945,7 @@
         <p:spPr>
           <a:xfrm>
             <a:off x="936000" y="3391200"/>
-            <a:ext cx="7486920" cy="1287720"/>
+            <a:ext cx="7486560" cy="1287360"/>
           </a:xfrm>
           <a:prstGeom prst="rect">
             <a:avLst/>

</xml_diff>